<commit_message>
Update slide and UI
</commit_message>
<xml_diff>
--- a/HtmlProject/NodejsCompleteServer/Slide/天氣概況綜合資訊站 - 3rd stage.pptx
+++ b/HtmlProject/NodejsCompleteServer/Slide/天氣概況綜合資訊站 - 3rd stage.pptx
@@ -8,15 +8,16 @@
     <p:sldId id="256" r:id="rId2"/>
     <p:sldId id="258" r:id="rId3"/>
     <p:sldId id="257" r:id="rId4"/>
-    <p:sldId id="267" r:id="rId5"/>
-    <p:sldId id="268" r:id="rId6"/>
-    <p:sldId id="269" r:id="rId7"/>
-    <p:sldId id="259" r:id="rId8"/>
+    <p:sldId id="268" r:id="rId5"/>
+    <p:sldId id="274" r:id="rId6"/>
+    <p:sldId id="267" r:id="rId7"/>
+    <p:sldId id="273" r:id="rId8"/>
     <p:sldId id="270" r:id="rId9"/>
-    <p:sldId id="271" r:id="rId10"/>
-    <p:sldId id="260" r:id="rId11"/>
-    <p:sldId id="272" r:id="rId12"/>
-    <p:sldId id="261" r:id="rId13"/>
+    <p:sldId id="275" r:id="rId10"/>
+    <p:sldId id="271" r:id="rId11"/>
+    <p:sldId id="260" r:id="rId12"/>
+    <p:sldId id="272" r:id="rId13"/>
+    <p:sldId id="261" r:id="rId14"/>
   </p:sldIdLst>
   <p:sldSz cx="9144000" cy="6858000" type="screen4x3"/>
   <p:notesSz cx="6858000" cy="9144000"/>
@@ -3382,6 +3383,253 @@
           <a:p>
             <a:r>
               <a:rPr lang="zh-TW" altLang="en-US" dirty="0" smtClean="0"/>
+              <a:t>問題及解決方式</a:t>
+            </a:r>
+            <a:endParaRPr lang="zh-TW" altLang="en-US" dirty="0"/>
+          </a:p>
+        </p:txBody>
+      </p:sp>
+      <p:sp>
+        <p:nvSpPr>
+          <p:cNvPr id="3" name="內容版面配置區 2"/>
+          <p:cNvSpPr>
+            <a:spLocks noGrp="1"/>
+          </p:cNvSpPr>
+          <p:nvPr>
+            <p:ph idx="1"/>
+          </p:nvPr>
+        </p:nvSpPr>
+        <p:spPr/>
+        <p:txBody>
+          <a:bodyPr>
+            <a:normAutofit fontScale="85000" lnSpcReduction="20000"/>
+          </a:bodyPr>
+          <a:lstStyle/>
+          <a:p>
+            <a:r>
+              <a:rPr lang="en-US" altLang="zh-TW" dirty="0" smtClean="0"/>
+              <a:t>Node.js server</a:t>
+            </a:r>
+            <a:r>
+              <a:rPr lang="zh-TW" altLang="en-US" dirty="0" smtClean="0"/>
+              <a:t>在將資料回給前端時若是非同步沒處理好會遇到</a:t>
+            </a:r>
+            <a:r>
+              <a:rPr lang="en-US" altLang="zh-TW" dirty="0" smtClean="0"/>
+              <a:t>write after end</a:t>
+            </a:r>
+            <a:r>
+              <a:rPr lang="zh-TW" altLang="en-US" dirty="0" smtClean="0"/>
+              <a:t>的問題，必須設計好整體流程來避免</a:t>
+            </a:r>
+            <a:endParaRPr lang="en-US" altLang="zh-TW" dirty="0" smtClean="0"/>
+          </a:p>
+          <a:p>
+            <a:r>
+              <a:rPr lang="zh-TW" altLang="en-US" dirty="0" smtClean="0"/>
+              <a:t>原本想以</a:t>
+            </a:r>
+            <a:r>
+              <a:rPr lang="en-US" altLang="zh-TW" dirty="0" smtClean="0"/>
+              <a:t>xml parser</a:t>
+            </a:r>
+            <a:r>
+              <a:rPr lang="zh-TW" altLang="en-US" dirty="0" smtClean="0"/>
+              <a:t>同時處理</a:t>
+            </a:r>
+            <a:r>
+              <a:rPr lang="en-US" altLang="zh-TW" dirty="0" smtClean="0"/>
+              <a:t>html</a:t>
+            </a:r>
+            <a:r>
+              <a:rPr lang="zh-TW" altLang="en-US" dirty="0" smtClean="0"/>
+              <a:t>與</a:t>
+            </a:r>
+            <a:r>
+              <a:rPr lang="en-US" altLang="zh-TW" dirty="0" smtClean="0"/>
+              <a:t>xml</a:t>
+            </a:r>
+            <a:r>
+              <a:rPr lang="zh-TW" altLang="en-US" dirty="0" smtClean="0"/>
+              <a:t>的資料，但發現中央氣象局的網頁</a:t>
+            </a:r>
+            <a:r>
+              <a:rPr lang="en-US" altLang="zh-TW" dirty="0" smtClean="0"/>
+              <a:t>html</a:t>
+            </a:r>
+            <a:r>
+              <a:rPr lang="zh-TW" altLang="en-US" dirty="0" smtClean="0"/>
+              <a:t>寫法並不符合</a:t>
+            </a:r>
+            <a:r>
+              <a:rPr lang="en-US" altLang="zh-TW" dirty="0" smtClean="0"/>
+              <a:t>xml</a:t>
+            </a:r>
+            <a:r>
+              <a:rPr lang="zh-TW" altLang="en-US" dirty="0" smtClean="0"/>
+              <a:t>的標準，最後使用</a:t>
+            </a:r>
+            <a:r>
+              <a:rPr lang="en-US" altLang="zh-TW" dirty="0" err="1" smtClean="0"/>
+              <a:t>himalaya</a:t>
+            </a:r>
+            <a:r>
+              <a:rPr lang="zh-TW" altLang="en-US" dirty="0" smtClean="0"/>
+              <a:t>套件進行</a:t>
+            </a:r>
+            <a:r>
+              <a:rPr lang="en-US" altLang="zh-TW" dirty="0" smtClean="0"/>
+              <a:t>html</a:t>
+            </a:r>
+            <a:r>
+              <a:rPr lang="zh-TW" altLang="en-US" dirty="0" smtClean="0"/>
+              <a:t>格式資料的處理</a:t>
+            </a:r>
+            <a:endParaRPr lang="en-US" altLang="zh-TW" dirty="0" smtClean="0"/>
+          </a:p>
+          <a:p>
+            <a:r>
+              <a:rPr lang="zh-TW" altLang="en-US" dirty="0" smtClean="0"/>
+              <a:t>紀錄地點功能，考量當時還未使用資料庫，所以選擇使用</a:t>
+            </a:r>
+            <a:r>
+              <a:rPr lang="en-US" altLang="zh-TW" dirty="0" smtClean="0"/>
+              <a:t>Cookie</a:t>
+            </a:r>
+            <a:r>
+              <a:rPr lang="zh-TW" altLang="en-US" dirty="0" smtClean="0"/>
+              <a:t>方式紀錄。</a:t>
+            </a:r>
+            <a:endParaRPr lang="en-US" altLang="zh-TW" dirty="0" smtClean="0"/>
+          </a:p>
+          <a:p>
+            <a:r>
+              <a:rPr lang="zh-TW" altLang="en-US" dirty="0" smtClean="0"/>
+              <a:t>後端選擇</a:t>
+            </a:r>
+            <a:r>
+              <a:rPr lang="en-US" altLang="zh-TW" dirty="0" smtClean="0"/>
+              <a:t>Node.js</a:t>
+            </a:r>
+            <a:r>
+              <a:rPr lang="zh-TW" altLang="en-US" dirty="0" smtClean="0"/>
+              <a:t>開發後，原本打算搭配</a:t>
+            </a:r>
+            <a:r>
+              <a:rPr lang="en-US" altLang="zh-TW" dirty="0" smtClean="0"/>
+              <a:t>MSSQL</a:t>
+            </a:r>
+            <a:r>
+              <a:rPr lang="zh-TW" altLang="en-US" dirty="0" smtClean="0"/>
+              <a:t>，經過詳細考量，資料大部分非固定表格模式、關聯性低，格式以</a:t>
+            </a:r>
+            <a:r>
+              <a:rPr lang="en-US" altLang="zh-TW" dirty="0" smtClean="0"/>
+              <a:t>JSON</a:t>
+            </a:r>
+            <a:r>
+              <a:rPr lang="zh-TW" altLang="en-US" dirty="0" smtClean="0"/>
+              <a:t>、</a:t>
+            </a:r>
+            <a:r>
+              <a:rPr lang="en-US" altLang="zh-TW" dirty="0" smtClean="0"/>
+              <a:t>XML</a:t>
+            </a:r>
+            <a:r>
+              <a:rPr lang="zh-TW" altLang="en-US" dirty="0" smtClean="0"/>
+              <a:t>資料為主，所以最終選擇</a:t>
+            </a:r>
+            <a:r>
+              <a:rPr lang="en-US" altLang="zh-TW" dirty="0" err="1" smtClean="0"/>
+              <a:t>NoSQL</a:t>
+            </a:r>
+            <a:r>
+              <a:rPr lang="en-US" altLang="zh-TW" dirty="0" smtClean="0"/>
+              <a:t>(</a:t>
+            </a:r>
+            <a:r>
+              <a:rPr lang="en-US" altLang="zh-TW" dirty="0" err="1" smtClean="0"/>
+              <a:t>mongoDB</a:t>
+            </a:r>
+            <a:r>
+              <a:rPr lang="en-US" altLang="zh-TW" dirty="0" smtClean="0"/>
+              <a:t>)</a:t>
+            </a:r>
+            <a:r>
+              <a:rPr lang="zh-TW" altLang="en-US" dirty="0" smtClean="0"/>
+              <a:t>資料庫。</a:t>
+            </a:r>
+            <a:endParaRPr lang="en-US" altLang="zh-TW" dirty="0" smtClean="0"/>
+          </a:p>
+          <a:p>
+            <a:endParaRPr lang="en-US" altLang="zh-TW" dirty="0" smtClean="0"/>
+          </a:p>
+          <a:p>
+            <a:endParaRPr lang="en-US" altLang="zh-TW" dirty="0" smtClean="0"/>
+          </a:p>
+          <a:p>
+            <a:endParaRPr lang="en-US" altLang="zh-TW" dirty="0" smtClean="0"/>
+          </a:p>
+          <a:p>
+            <a:endParaRPr lang="en-US" altLang="zh-TW" dirty="0" smtClean="0"/>
+          </a:p>
+          <a:p>
+            <a:endParaRPr lang="en-US" altLang="zh-TW" dirty="0" smtClean="0"/>
+          </a:p>
+          <a:p>
+            <a:endParaRPr lang="zh-TW" altLang="en-US" dirty="0"/>
+          </a:p>
+        </p:txBody>
+      </p:sp>
+    </p:spTree>
+  </p:cSld>
+  <p:clrMapOvr>
+    <a:masterClrMapping/>
+  </p:clrMapOvr>
+  <p:timing>
+    <p:tnLst>
+      <p:par>
+        <p:cTn id="1" dur="indefinite" restart="never" nodeType="tmRoot"/>
+      </p:par>
+    </p:tnLst>
+  </p:timing>
+</p:sld>
+</file>
+
+<file path=ppt/slides/slide11.xml><?xml version="1.0" encoding="utf-8"?>
+<p:sld xmlns:a="http://schemas.openxmlformats.org/drawingml/2006/main" xmlns:r="http://schemas.openxmlformats.org/officeDocument/2006/relationships" xmlns:p="http://schemas.openxmlformats.org/presentationml/2006/main">
+  <p:cSld>
+    <p:spTree>
+      <p:nvGrpSpPr>
+        <p:cNvPr id="1" name=""/>
+        <p:cNvGrpSpPr/>
+        <p:nvPr/>
+      </p:nvGrpSpPr>
+      <p:grpSpPr>
+        <a:xfrm>
+          <a:off x="0" y="0"/>
+          <a:ext cx="0" cy="0"/>
+          <a:chOff x="0" y="0"/>
+          <a:chExt cx="0" cy="0"/>
+        </a:xfrm>
+      </p:grpSpPr>
+      <p:sp>
+        <p:nvSpPr>
+          <p:cNvPr id="2" name="標題 1"/>
+          <p:cNvSpPr>
+            <a:spLocks noGrp="1"/>
+          </p:cNvSpPr>
+          <p:nvPr>
+            <p:ph type="title"/>
+          </p:nvPr>
+        </p:nvSpPr>
+        <p:spPr/>
+        <p:txBody>
+          <a:bodyPr/>
+          <a:lstStyle/>
+          <a:p>
+            <a:r>
+              <a:rPr lang="zh-TW" altLang="en-US" dirty="0" smtClean="0"/>
               <a:t>成員分工</a:t>
             </a:r>
             <a:endParaRPr lang="zh-TW" altLang="en-US" dirty="0"/>
@@ -3400,7 +3648,7 @@
         </p:nvGraphicFramePr>
         <p:xfrm>
           <a:off x="304800" y="1554163"/>
-          <a:ext cx="8686800" cy="3337560"/>
+          <a:ext cx="8686800" cy="4079240"/>
         </p:xfrm>
         <a:graphic>
           <a:graphicData uri="http://schemas.openxmlformats.org/drawingml/2006/table">
@@ -3815,6 +4063,102 @@
                   <a:tcPr/>
                 </a:tc>
               </a:tr>
+              <a:tr h="370840">
+                <a:tc>
+                  <a:txBody>
+                    <a:bodyPr/>
+                    <a:lstStyle/>
+                    <a:p>
+                      <a:r>
+                        <a:rPr lang="en-US" altLang="zh-TW" dirty="0" smtClean="0"/>
+                        <a:t>Google map</a:t>
+                      </a:r>
+                      <a:r>
+                        <a:rPr lang="zh-TW" altLang="en-US" dirty="0" smtClean="0"/>
+                        <a:t>路徑規劃</a:t>
+                      </a:r>
+                      <a:endParaRPr lang="zh-TW" altLang="en-US" dirty="0"/>
+                    </a:p>
+                  </a:txBody>
+                  <a:tcPr/>
+                </a:tc>
+                <a:tc>
+                  <a:txBody>
+                    <a:bodyPr/>
+                    <a:lstStyle/>
+                    <a:p>
+                      <a:pPr algn="ctr"/>
+                      <a:endParaRPr lang="zh-TW" altLang="en-US" dirty="0"/>
+                    </a:p>
+                  </a:txBody>
+                  <a:tcPr/>
+                </a:tc>
+                <a:tc>
+                  <a:txBody>
+                    <a:bodyPr/>
+                    <a:lstStyle/>
+                    <a:p>
+                      <a:pPr algn="ctr"/>
+                      <a:r>
+                        <a:rPr lang="en-US" altLang="zh-TW" dirty="0" smtClean="0"/>
+                        <a:t>V</a:t>
+                      </a:r>
+                      <a:endParaRPr lang="zh-TW" altLang="en-US" dirty="0"/>
+                    </a:p>
+                  </a:txBody>
+                  <a:tcPr/>
+                </a:tc>
+              </a:tr>
+              <a:tr h="370840">
+                <a:tc>
+                  <a:txBody>
+                    <a:bodyPr/>
+                    <a:lstStyle/>
+                    <a:p>
+                      <a:r>
+                        <a:rPr lang="en-US" altLang="zh-TW" dirty="0" smtClean="0"/>
+                        <a:t>Google/</a:t>
+                      </a:r>
+                      <a:r>
+                        <a:rPr lang="en-US" altLang="zh-TW" dirty="0" err="1" smtClean="0"/>
+                        <a:t>Facebook</a:t>
+                      </a:r>
+                      <a:r>
+                        <a:rPr lang="en-US" altLang="zh-TW" baseline="0" dirty="0" smtClean="0"/>
+                        <a:t> account</a:t>
+                      </a:r>
+                      <a:endParaRPr lang="zh-TW" altLang="en-US" dirty="0"/>
+                    </a:p>
+                  </a:txBody>
+                  <a:tcPr/>
+                </a:tc>
+                <a:tc>
+                  <a:txBody>
+                    <a:bodyPr/>
+                    <a:lstStyle/>
+                    <a:p>
+                      <a:pPr algn="ctr"/>
+                      <a:r>
+                        <a:rPr lang="en-US" altLang="zh-TW" dirty="0" smtClean="0"/>
+                        <a:t>V</a:t>
+                      </a:r>
+                      <a:endParaRPr lang="zh-TW" altLang="en-US" dirty="0"/>
+                    </a:p>
+                  </a:txBody>
+                  <a:tcPr/>
+                </a:tc>
+                <a:tc>
+                  <a:txBody>
+                    <a:bodyPr/>
+                    <a:lstStyle/>
+                    <a:p>
+                      <a:pPr algn="ctr"/>
+                      <a:endParaRPr lang="zh-TW" altLang="en-US" dirty="0"/>
+                    </a:p>
+                  </a:txBody>
+                  <a:tcPr/>
+                </a:tc>
+              </a:tr>
             </a:tbl>
           </a:graphicData>
         </a:graphic>
@@ -3827,7 +4171,7 @@
         </p:nvSpPr>
         <p:spPr>
           <a:xfrm>
-            <a:off x="395536" y="4945811"/>
+            <a:off x="575048" y="5733256"/>
             <a:ext cx="8568952" cy="1723549"/>
           </a:xfrm>
           <a:prstGeom prst="rect">
@@ -4065,7 +4409,7 @@
 </p:sld>
 </file>
 
-<file path=ppt/slides/slide11.xml><?xml version="1.0" encoding="utf-8"?>
+<file path=ppt/slides/slide12.xml><?xml version="1.0" encoding="utf-8"?>
 <p:sld xmlns:a="http://schemas.openxmlformats.org/drawingml/2006/main" xmlns:r="http://schemas.openxmlformats.org/officeDocument/2006/relationships" xmlns:p="http://schemas.openxmlformats.org/presentationml/2006/main">
   <p:cSld>
     <p:spTree>
@@ -4164,7 +4508,7 @@
 </p:sld>
 </file>
 
-<file path=ppt/slides/slide12.xml><?xml version="1.0" encoding="utf-8"?>
+<file path=ppt/slides/slide13.xml><?xml version="1.0" encoding="utf-8"?>
 <p:sld xmlns:a="http://schemas.openxmlformats.org/drawingml/2006/main" xmlns:r="http://schemas.openxmlformats.org/officeDocument/2006/relationships" xmlns:p="http://schemas.openxmlformats.org/presentationml/2006/main">
   <p:cSld>
     <p:spTree>
@@ -4434,51 +4778,46 @@
           <a:p>
             <a:r>
               <a:rPr lang="zh-TW" altLang="en-US" dirty="0" smtClean="0"/>
-              <a:t>以</a:t>
-            </a:r>
+              <a:t>介面調整</a:t>
+            </a:r>
+            <a:endParaRPr lang="en-US" altLang="zh-TW" dirty="0" smtClean="0"/>
+          </a:p>
+          <a:p>
+            <a:r>
+              <a:rPr lang="zh-TW" altLang="en-US" dirty="0" smtClean="0"/>
+              <a:t>增加</a:t>
+            </a:r>
+            <a:r>
+              <a:rPr lang="zh-TW" altLang="en-US" dirty="0" smtClean="0"/>
+              <a:t>資訊種類</a:t>
+            </a:r>
+            <a:endParaRPr lang="en-US" altLang="zh-TW" dirty="0" smtClean="0"/>
+          </a:p>
+          <a:p>
+            <a:r>
+              <a:rPr lang="zh-TW" altLang="en-US" dirty="0" smtClean="0"/>
+              <a:t>路徑</a:t>
+            </a:r>
+            <a:r>
+              <a:rPr lang="zh-TW" altLang="en-US" dirty="0" smtClean="0"/>
+              <a:t>規劃</a:t>
+            </a:r>
+            <a:endParaRPr lang="en-US" altLang="zh-TW" dirty="0" smtClean="0"/>
+          </a:p>
+          <a:p>
             <a:r>
               <a:rPr lang="en-US" altLang="zh-TW" dirty="0" smtClean="0"/>
-              <a:t>RWD</a:t>
-            </a:r>
-            <a:r>
-              <a:rPr lang="zh-TW" altLang="en-US" dirty="0" smtClean="0"/>
-              <a:t>的概念進行介面</a:t>
-            </a:r>
-            <a:r>
-              <a:rPr lang="zh-TW" altLang="en-US" dirty="0" smtClean="0"/>
-              <a:t>調整</a:t>
-            </a:r>
-            <a:endParaRPr lang="en-US" altLang="zh-TW" dirty="0" smtClean="0"/>
-          </a:p>
-          <a:p>
-            <a:r>
-              <a:rPr lang="zh-TW" altLang="en-US" dirty="0" smtClean="0"/>
-              <a:t>點擊地點鄰近無線網路及景點資訊</a:t>
-            </a:r>
-            <a:endParaRPr lang="en-US" altLang="zh-TW" dirty="0" smtClean="0"/>
-          </a:p>
-          <a:p>
-            <a:r>
-              <a:rPr lang="zh-TW" altLang="en-US" dirty="0" smtClean="0"/>
-              <a:t>路徑規劃</a:t>
-            </a:r>
-            <a:endParaRPr lang="en-US" altLang="zh-TW" dirty="0" smtClean="0"/>
-          </a:p>
-          <a:p>
-            <a:r>
-              <a:rPr lang="en-US" altLang="zh-TW" dirty="0" smtClean="0"/>
-              <a:t>Google account</a:t>
-            </a:r>
-          </a:p>
-          <a:p>
+              <a:t>Login by Google/</a:t>
+            </a:r>
             <a:r>
               <a:rPr lang="en-US" altLang="zh-TW" dirty="0" err="1" smtClean="0"/>
-              <a:t>Facebook</a:t>
+              <a:t>Facabook</a:t>
             </a:r>
             <a:r>
               <a:rPr lang="en-US" altLang="zh-TW" dirty="0" smtClean="0"/>
               <a:t> account</a:t>
             </a:r>
+            <a:endParaRPr lang="en-US" altLang="zh-TW" dirty="0" smtClean="0"/>
           </a:p>
           <a:p>
             <a:endParaRPr lang="zh-TW" altLang="en-US" dirty="0"/>
@@ -4557,42 +4896,36 @@
           </a:bodyPr>
           <a:lstStyle/>
           <a:p>
+            <a:r>
+              <a:rPr lang="zh-TW" altLang="en-US" dirty="0" smtClean="0"/>
+              <a:t>以</a:t>
+            </a:r>
+            <a:r>
+              <a:rPr lang="en-US" altLang="zh-TW" dirty="0" smtClean="0"/>
+              <a:t>RWD</a:t>
+            </a:r>
+            <a:r>
+              <a:rPr lang="zh-TW" altLang="en-US" dirty="0" smtClean="0"/>
+              <a:t>的概念進行介面調整以適應不同裝置的不同</a:t>
+            </a:r>
+            <a:r>
+              <a:rPr lang="zh-TW" altLang="en-US" dirty="0" smtClean="0"/>
+              <a:t>解析度</a:t>
+            </a:r>
             <a:endParaRPr lang="en-US" altLang="zh-TW" dirty="0" smtClean="0"/>
           </a:p>
-        </p:txBody>
-      </p:sp>
-      <p:pic>
-        <p:nvPicPr>
-          <p:cNvPr id="1027" name="Picture 3"/>
-          <p:cNvPicPr>
-            <a:picLocks noChangeAspect="1" noChangeArrowheads="1"/>
-          </p:cNvPicPr>
-          <p:nvPr/>
-        </p:nvPicPr>
-        <p:blipFill>
-          <a:blip r:embed="rId2" cstate="print"/>
-          <a:srcRect/>
-          <a:stretch>
-            <a:fillRect/>
-          </a:stretch>
-        </p:blipFill>
-        <p:spPr bwMode="auto">
-          <a:xfrm>
-            <a:off x="203515" y="1556792"/>
-            <a:ext cx="8760973" cy="4928048"/>
-          </a:xfrm>
-          <a:prstGeom prst="rect">
-            <a:avLst/>
-          </a:prstGeom>
-          <a:noFill/>
-          <a:ln w="9525">
-            <a:noFill/>
-            <a:miter lim="800000"/>
-            <a:headEnd/>
-            <a:tailEnd/>
-          </a:ln>
-        </p:spPr>
-      </p:pic>
+          <a:p>
+            <a:r>
+              <a:rPr lang="zh-TW" altLang="en-US" dirty="0" smtClean="0"/>
+              <a:t>使元件根據不同解析度進行動態的調整</a:t>
+            </a:r>
+            <a:endParaRPr lang="en-US" altLang="zh-TW" dirty="0" smtClean="0"/>
+          </a:p>
+          <a:p>
+            <a:endParaRPr lang="en-US" altLang="zh-TW" dirty="0" smtClean="0"/>
+          </a:p>
+        </p:txBody>
+      </p:sp>
     </p:spTree>
   </p:cSld>
   <p:clrMapOvr>
@@ -4665,38 +4998,42 @@
           </a:bodyPr>
           <a:lstStyle/>
           <a:p>
-            <a:r>
-              <a:rPr lang="zh-TW" altLang="en-US" dirty="0" smtClean="0"/>
-              <a:t>整體設計調整</a:t>
-            </a:r>
             <a:endParaRPr lang="en-US" altLang="zh-TW" dirty="0" smtClean="0"/>
           </a:p>
-          <a:p>
-            <a:r>
-              <a:rPr lang="zh-TW" altLang="en-US" dirty="0" smtClean="0"/>
-              <a:t>移除冗餘資訊</a:t>
-            </a:r>
-            <a:endParaRPr lang="en-US" altLang="zh-TW" dirty="0" smtClean="0"/>
-          </a:p>
-          <a:p>
-            <a:r>
-              <a:rPr lang="zh-TW" altLang="en-US" dirty="0" smtClean="0"/>
-              <a:t>以文字結合圖像提示使用者當天天氣概況</a:t>
-            </a:r>
-            <a:endParaRPr lang="en-US" altLang="zh-TW" dirty="0" smtClean="0"/>
-          </a:p>
-          <a:p>
-            <a:r>
-              <a:rPr lang="zh-TW" altLang="en-US" dirty="0" smtClean="0"/>
-              <a:t>以顏色提示紫外線以及空氣品質是否處於需要注意的狀態</a:t>
-            </a:r>
-            <a:endParaRPr lang="en-US" altLang="zh-TW" dirty="0" smtClean="0"/>
-          </a:p>
-          <a:p>
-            <a:endParaRPr lang="en-US" altLang="zh-TW" dirty="0" smtClean="0"/>
-          </a:p>
-        </p:txBody>
-      </p:sp>
+        </p:txBody>
+      </p:sp>
+      <p:pic>
+        <p:nvPicPr>
+          <p:cNvPr id="2051" name="Picture 3"/>
+          <p:cNvPicPr>
+            <a:picLocks noChangeAspect="1" noChangeArrowheads="1"/>
+          </p:cNvPicPr>
+          <p:nvPr/>
+        </p:nvPicPr>
+        <p:blipFill>
+          <a:blip r:embed="rId2" cstate="print"/>
+          <a:srcRect/>
+          <a:stretch>
+            <a:fillRect/>
+          </a:stretch>
+        </p:blipFill>
+        <p:spPr bwMode="auto">
+          <a:xfrm>
+            <a:off x="323528" y="1572344"/>
+            <a:ext cx="8568952" cy="4641516"/>
+          </a:xfrm>
+          <a:prstGeom prst="rect">
+            <a:avLst/>
+          </a:prstGeom>
+          <a:noFill/>
+          <a:ln w="9525">
+            <a:noFill/>
+            <a:miter lim="800000"/>
+            <a:headEnd/>
+            <a:tailEnd/>
+          </a:ln>
+        </p:spPr>
+      </p:pic>
     </p:spTree>
   </p:cSld>
   <p:clrMapOvr>
@@ -4746,7 +5083,7 @@
           <a:p>
             <a:r>
               <a:rPr lang="zh-TW" altLang="en-US" dirty="0" smtClean="0"/>
-              <a:t>取得資料方式</a:t>
+              <a:t>介面調整</a:t>
             </a:r>
             <a:endParaRPr lang="zh-TW" altLang="en-US" dirty="0"/>
           </a:p>
@@ -4769,113 +5106,42 @@
           </a:bodyPr>
           <a:lstStyle/>
           <a:p>
-            <a:r>
-              <a:rPr lang="zh-TW" altLang="en-US" dirty="0" smtClean="0"/>
-              <a:t>捨棄第一階段使用的</a:t>
-            </a:r>
-            <a:r>
-              <a:rPr lang="en-US" altLang="zh-TW" dirty="0" smtClean="0"/>
-              <a:t>YQL</a:t>
-            </a:r>
-          </a:p>
-          <a:p>
-            <a:r>
-              <a:rPr lang="zh-TW" altLang="en-US" dirty="0" smtClean="0"/>
-              <a:t>架設以</a:t>
-            </a:r>
-            <a:r>
-              <a:rPr lang="en-US" altLang="zh-TW" dirty="0" smtClean="0"/>
-              <a:t>Node.js</a:t>
-            </a:r>
-            <a:r>
-              <a:rPr lang="zh-TW" altLang="en-US" dirty="0" smtClean="0"/>
-              <a:t>開發之</a:t>
-            </a:r>
-            <a:r>
-              <a:rPr lang="en-US" altLang="zh-TW" dirty="0" smtClean="0"/>
-              <a:t>server</a:t>
-            </a:r>
-            <a:r>
-              <a:rPr lang="zh-TW" altLang="en-US" dirty="0" smtClean="0"/>
-              <a:t>負責接收前端的命令，以</a:t>
-            </a:r>
-            <a:r>
-              <a:rPr lang="en-US" altLang="zh-TW" dirty="0" smtClean="0"/>
-              <a:t>http request</a:t>
-            </a:r>
-            <a:r>
-              <a:rPr lang="zh-TW" altLang="en-US" dirty="0" smtClean="0"/>
-              <a:t>取得對應的資料後再依照資料來源的格式處理後送至前端</a:t>
-            </a:r>
             <a:endParaRPr lang="en-US" altLang="zh-TW" dirty="0" smtClean="0"/>
           </a:p>
-          <a:p>
-            <a:r>
-              <a:rPr lang="en-US" altLang="zh-TW" dirty="0" err="1" smtClean="0"/>
-              <a:t>Json</a:t>
-            </a:r>
-            <a:r>
-              <a:rPr lang="zh-TW" altLang="en-US" dirty="0" smtClean="0"/>
-              <a:t>格式可直接送回</a:t>
-            </a:r>
-            <a:endParaRPr lang="en-US" altLang="zh-TW" dirty="0" smtClean="0"/>
-          </a:p>
-          <a:p>
-            <a:r>
-              <a:rPr lang="en-US" altLang="zh-TW" dirty="0" smtClean="0"/>
-              <a:t>Xml</a:t>
-            </a:r>
-            <a:r>
-              <a:rPr lang="zh-TW" altLang="en-US" dirty="0" smtClean="0"/>
-              <a:t>格式以</a:t>
-            </a:r>
-            <a:r>
-              <a:rPr lang="en-US" altLang="zh-TW" dirty="0" smtClean="0"/>
-              <a:t>xml2js</a:t>
-            </a:r>
-            <a:r>
-              <a:rPr lang="zh-TW" altLang="en-US" dirty="0" smtClean="0"/>
-              <a:t>套件轉為</a:t>
-            </a:r>
-            <a:r>
-              <a:rPr lang="en-US" altLang="zh-TW" dirty="0" err="1" smtClean="0"/>
-              <a:t>json</a:t>
-            </a:r>
-            <a:r>
-              <a:rPr lang="zh-TW" altLang="en-US" dirty="0" smtClean="0"/>
-              <a:t>格式後送回</a:t>
-            </a:r>
-            <a:endParaRPr lang="en-US" altLang="zh-TW" dirty="0" smtClean="0"/>
-          </a:p>
-          <a:p>
-            <a:r>
-              <a:rPr lang="en-US" altLang="zh-TW" dirty="0" smtClean="0"/>
-              <a:t>Html</a:t>
-            </a:r>
-            <a:r>
-              <a:rPr lang="zh-TW" altLang="en-US" dirty="0" smtClean="0"/>
-              <a:t>格式以</a:t>
-            </a:r>
-            <a:r>
-              <a:rPr lang="en-US" altLang="zh-TW" dirty="0" err="1" smtClean="0"/>
-              <a:t>himalaya</a:t>
-            </a:r>
-            <a:r>
-              <a:rPr lang="zh-TW" altLang="en-US" dirty="0" smtClean="0"/>
-              <a:t>套件轉為</a:t>
-            </a:r>
-            <a:r>
-              <a:rPr lang="en-US" altLang="zh-TW" dirty="0" err="1" smtClean="0"/>
-              <a:t>json</a:t>
-            </a:r>
-            <a:r>
-              <a:rPr lang="zh-TW" altLang="en-US" dirty="0" smtClean="0"/>
-              <a:t>格式後送回</a:t>
-            </a:r>
-            <a:endParaRPr lang="en-US" altLang="zh-TW" dirty="0" smtClean="0"/>
-          </a:p>
-        </p:txBody>
-      </p:sp>
+        </p:txBody>
+      </p:sp>
+      <p:pic>
+        <p:nvPicPr>
+          <p:cNvPr id="1030" name="Picture 6"/>
+          <p:cNvPicPr>
+            <a:picLocks noChangeAspect="1" noChangeArrowheads="1"/>
+          </p:cNvPicPr>
+          <p:nvPr/>
+        </p:nvPicPr>
+        <p:blipFill>
+          <a:blip r:embed="rId2" cstate="print"/>
+          <a:srcRect/>
+          <a:stretch>
+            <a:fillRect/>
+          </a:stretch>
+        </p:blipFill>
+        <p:spPr bwMode="auto">
+          <a:xfrm>
+            <a:off x="323529" y="1556792"/>
+            <a:ext cx="8640960" cy="5192885"/>
+          </a:xfrm>
+          <a:prstGeom prst="rect">
+            <a:avLst/>
+          </a:prstGeom>
+          <a:noFill/>
+          <a:ln w="9525">
+            <a:noFill/>
+            <a:miter lim="800000"/>
+            <a:headEnd/>
+            <a:tailEnd/>
+          </a:ln>
+        </p:spPr>
+      </p:pic>
     </p:spTree>
   </p:cSld>
   <p:clrMapOvr>
@@ -4925,7 +5191,7 @@
           <a:p>
             <a:r>
               <a:rPr lang="zh-TW" altLang="en-US" dirty="0" smtClean="0"/>
-              <a:t>資料庫</a:t>
+              <a:t>介面調整</a:t>
             </a:r>
             <a:endParaRPr lang="zh-TW" altLang="en-US" dirty="0"/>
           </a:p>
@@ -4948,62 +5214,138 @@
           </a:bodyPr>
           <a:lstStyle/>
           <a:p>
-            <a:r>
-              <a:rPr lang="zh-TW" altLang="en-US" dirty="0" smtClean="0"/>
-              <a:t>由於有時候會遇到政府的</a:t>
-            </a:r>
-            <a:r>
-              <a:rPr lang="en-US" altLang="zh-TW" dirty="0" smtClean="0"/>
-              <a:t>open data</a:t>
-            </a:r>
-            <a:r>
-              <a:rPr lang="zh-TW" altLang="en-US" dirty="0" smtClean="0"/>
-              <a:t>網站不穩定的狀況，因此選擇加入資料庫功能用以儲存最後的有效資料以供使用</a:t>
-            </a:r>
             <a:endParaRPr lang="en-US" altLang="zh-TW" dirty="0" smtClean="0"/>
           </a:p>
-          <a:p>
-            <a:r>
-              <a:rPr lang="zh-TW" altLang="en-US" dirty="0" smtClean="0"/>
-              <a:t>後端</a:t>
-            </a:r>
-            <a:r>
-              <a:rPr lang="en-US" altLang="zh-TW" dirty="0" smtClean="0"/>
-              <a:t>Server</a:t>
-            </a:r>
-            <a:r>
-              <a:rPr lang="zh-TW" altLang="en-US" dirty="0" smtClean="0"/>
-              <a:t>取得遠端</a:t>
-            </a:r>
-            <a:r>
-              <a:rPr lang="en-US" altLang="zh-TW" dirty="0" smtClean="0"/>
-              <a:t>open data</a:t>
-            </a:r>
-            <a:r>
-              <a:rPr lang="zh-TW" altLang="en-US" dirty="0" smtClean="0"/>
-              <a:t>時，存入最新資料至資料庫，後端</a:t>
-            </a:r>
-            <a:r>
-              <a:rPr lang="en-US" altLang="zh-TW" dirty="0" smtClean="0"/>
-              <a:t>Server</a:t>
-            </a:r>
-            <a:r>
-              <a:rPr lang="zh-TW" altLang="en-US" dirty="0" smtClean="0"/>
-              <a:t>依照需求存取資料庫資料送至前端。</a:t>
-            </a:r>
-            <a:endParaRPr lang="en-US" altLang="zh-TW" dirty="0" smtClean="0"/>
-          </a:p>
-          <a:p>
-            <a:endParaRPr lang="en-US" altLang="zh-TW" dirty="0" smtClean="0"/>
-          </a:p>
-          <a:p>
-            <a:endParaRPr lang="en-US" altLang="zh-TW" dirty="0" smtClean="0"/>
-          </a:p>
-          <a:p>
-            <a:endParaRPr lang="zh-TW" altLang="en-US" dirty="0"/>
-          </a:p>
-        </p:txBody>
-      </p:sp>
+        </p:txBody>
+      </p:sp>
+      <p:pic>
+        <p:nvPicPr>
+          <p:cNvPr id="4" name="Picture 3"/>
+          <p:cNvPicPr>
+            <a:picLocks noChangeAspect="1" noChangeArrowheads="1"/>
+          </p:cNvPicPr>
+          <p:nvPr/>
+        </p:nvPicPr>
+        <p:blipFill>
+          <a:blip r:embed="rId2" cstate="print"/>
+          <a:srcRect/>
+          <a:stretch>
+            <a:fillRect/>
+          </a:stretch>
+        </p:blipFill>
+        <p:spPr bwMode="auto">
+          <a:xfrm>
+            <a:off x="323529" y="1556793"/>
+            <a:ext cx="2016223" cy="3587691"/>
+          </a:xfrm>
+          <a:prstGeom prst="rect">
+            <a:avLst/>
+          </a:prstGeom>
+          <a:noFill/>
+          <a:ln w="9525">
+            <a:noFill/>
+            <a:miter lim="800000"/>
+            <a:headEnd/>
+            <a:tailEnd/>
+          </a:ln>
+        </p:spPr>
+      </p:pic>
+      <p:pic>
+        <p:nvPicPr>
+          <p:cNvPr id="1028" name="Picture 4"/>
+          <p:cNvPicPr>
+            <a:picLocks noChangeAspect="1" noChangeArrowheads="1"/>
+          </p:cNvPicPr>
+          <p:nvPr/>
+        </p:nvPicPr>
+        <p:blipFill>
+          <a:blip r:embed="rId3" cstate="print"/>
+          <a:srcRect/>
+          <a:stretch>
+            <a:fillRect/>
+          </a:stretch>
+        </p:blipFill>
+        <p:spPr bwMode="auto">
+          <a:xfrm>
+            <a:off x="4499992" y="1556792"/>
+            <a:ext cx="2184182" cy="3888432"/>
+          </a:xfrm>
+          <a:prstGeom prst="rect">
+            <a:avLst/>
+          </a:prstGeom>
+          <a:noFill/>
+          <a:ln w="9525">
+            <a:noFill/>
+            <a:miter lim="800000"/>
+            <a:headEnd/>
+            <a:tailEnd/>
+          </a:ln>
+        </p:spPr>
+      </p:pic>
+      <p:pic>
+        <p:nvPicPr>
+          <p:cNvPr id="3074" name="Picture 2"/>
+          <p:cNvPicPr>
+            <a:picLocks noChangeAspect="1" noChangeArrowheads="1"/>
+          </p:cNvPicPr>
+          <p:nvPr/>
+        </p:nvPicPr>
+        <p:blipFill>
+          <a:blip r:embed="rId4" cstate="print"/>
+          <a:srcRect/>
+          <a:stretch>
+            <a:fillRect/>
+          </a:stretch>
+        </p:blipFill>
+        <p:spPr bwMode="auto">
+          <a:xfrm>
+            <a:off x="2411760" y="1556791"/>
+            <a:ext cx="2016224" cy="3587693"/>
+          </a:xfrm>
+          <a:prstGeom prst="rect">
+            <a:avLst/>
+          </a:prstGeom>
+          <a:noFill/>
+          <a:ln w="9525">
+            <a:noFill/>
+            <a:miter lim="800000"/>
+            <a:headEnd/>
+            <a:tailEnd/>
+          </a:ln>
+        </p:spPr>
+      </p:pic>
+      <p:pic>
+        <p:nvPicPr>
+          <p:cNvPr id="3075" name="Picture 3"/>
+          <p:cNvPicPr>
+            <a:picLocks noChangeAspect="1" noChangeArrowheads="1"/>
+          </p:cNvPicPr>
+          <p:nvPr/>
+        </p:nvPicPr>
+        <p:blipFill>
+          <a:blip r:embed="rId5" cstate="print"/>
+          <a:srcRect/>
+          <a:stretch>
+            <a:fillRect/>
+          </a:stretch>
+        </p:blipFill>
+        <p:spPr bwMode="auto">
+          <a:xfrm>
+            <a:off x="6804248" y="1556792"/>
+            <a:ext cx="2184182" cy="3888432"/>
+          </a:xfrm>
+          <a:prstGeom prst="rect">
+            <a:avLst/>
+          </a:prstGeom>
+          <a:noFill/>
+          <a:ln w="9525">
+            <a:noFill/>
+            <a:miter lim="800000"/>
+            <a:headEnd/>
+            <a:tailEnd/>
+          </a:ln>
+        </p:spPr>
+      </p:pic>
     </p:spTree>
   </p:cSld>
   <p:clrMapOvr>
@@ -5052,8 +5394,8 @@
           <a:lstStyle/>
           <a:p>
             <a:r>
-              <a:rPr lang="en-US" altLang="zh-TW" dirty="0" smtClean="0"/>
-              <a:t>Google map</a:t>
+              <a:rPr lang="zh-TW" altLang="en-US" dirty="0" smtClean="0"/>
+              <a:t>增加資料種類</a:t>
             </a:r>
             <a:endParaRPr lang="zh-TW" altLang="en-US" dirty="0"/>
           </a:p>
@@ -5078,32 +5420,94 @@
           <a:p>
             <a:r>
               <a:rPr lang="zh-TW" altLang="en-US" dirty="0" smtClean="0"/>
-              <a:t>加入定位功能</a:t>
+              <a:t>增加查詢點擊地點周邊區域之</a:t>
+            </a:r>
+            <a:r>
+              <a:rPr lang="en-US" altLang="zh-TW" dirty="0" err="1" smtClean="0"/>
+              <a:t>iTaiwan</a:t>
+            </a:r>
+            <a:r>
+              <a:rPr lang="zh-TW" altLang="en-US" dirty="0" smtClean="0"/>
+              <a:t>無線網路熱點及景點</a:t>
+            </a:r>
+            <a:r>
+              <a:rPr lang="zh-TW" altLang="en-US" dirty="0" smtClean="0"/>
+              <a:t>資訊之功能</a:t>
             </a:r>
             <a:endParaRPr lang="en-US" altLang="zh-TW" dirty="0" smtClean="0"/>
           </a:p>
           <a:p>
-            <a:r>
-              <a:rPr lang="zh-TW" altLang="en-US" dirty="0" smtClean="0"/>
-              <a:t>加入小視窗簡易天氣資訊</a:t>
-            </a:r>
             <a:endParaRPr lang="en-US" altLang="zh-TW" dirty="0" smtClean="0"/>
           </a:p>
           <a:p>
-            <a:r>
-              <a:rPr lang="zh-TW" altLang="en-US" dirty="0" smtClean="0"/>
-              <a:t>紀錄保留輸入地點</a:t>
-            </a:r>
-            <a:endParaRPr lang="en-US" altLang="zh-TW" dirty="0" smtClean="0"/>
-          </a:p>
-          <a:p>
-            <a:endParaRPr lang="en-US" altLang="zh-TW" dirty="0" smtClean="0"/>
-          </a:p>
-          <a:p>
             <a:endParaRPr lang="zh-TW" altLang="en-US" dirty="0"/>
           </a:p>
         </p:txBody>
       </p:sp>
+      <p:pic>
+        <p:nvPicPr>
+          <p:cNvPr id="5123" name="Picture 3"/>
+          <p:cNvPicPr>
+            <a:picLocks noChangeAspect="1" noChangeArrowheads="1"/>
+          </p:cNvPicPr>
+          <p:nvPr/>
+        </p:nvPicPr>
+        <p:blipFill>
+          <a:blip r:embed="rId2" cstate="print"/>
+          <a:srcRect/>
+          <a:stretch>
+            <a:fillRect/>
+          </a:stretch>
+        </p:blipFill>
+        <p:spPr bwMode="auto">
+          <a:xfrm>
+            <a:off x="323528" y="2636912"/>
+            <a:ext cx="5716328" cy="3096344"/>
+          </a:xfrm>
+          <a:prstGeom prst="rect">
+            <a:avLst/>
+          </a:prstGeom>
+          <a:noFill/>
+          <a:ln w="9525">
+            <a:noFill/>
+            <a:miter lim="800000"/>
+            <a:headEnd/>
+            <a:tailEnd/>
+          </a:ln>
+        </p:spPr>
+      </p:pic>
+      <p:pic>
+        <p:nvPicPr>
+          <p:cNvPr id="5124" name="Picture 4"/>
+          <p:cNvPicPr>
+            <a:picLocks noChangeAspect="1" noChangeArrowheads="1"/>
+          </p:cNvPicPr>
+          <p:nvPr/>
+        </p:nvPicPr>
+        <p:blipFill>
+          <a:blip r:embed="rId3" cstate="print"/>
+          <a:srcRect/>
+          <a:stretch>
+            <a:fillRect/>
+          </a:stretch>
+        </p:blipFill>
+        <p:spPr bwMode="auto">
+          <a:xfrm>
+            <a:off x="6300192" y="2636912"/>
+            <a:ext cx="2280460" cy="4059832"/>
+          </a:xfrm>
+          <a:prstGeom prst="rect">
+            <a:avLst/>
+          </a:prstGeom>
+          <a:noFill/>
+          <a:ln w="9525">
+            <a:noFill/>
+            <a:miter lim="800000"/>
+            <a:headEnd/>
+            <a:tailEnd/>
+          </a:ln>
+        </p:spPr>
+      </p:pic>
     </p:spTree>
   </p:cSld>
   <p:clrMapOvr>
@@ -5153,7 +5557,7 @@
           <a:p>
             <a:r>
               <a:rPr lang="zh-TW" altLang="en-US" dirty="0" smtClean="0"/>
-              <a:t>問題及解決方式</a:t>
+              <a:t>路徑規劃</a:t>
             </a:r>
             <a:endParaRPr lang="zh-TW" altLang="en-US" dirty="0"/>
           </a:p>
@@ -5172,185 +5576,94 @@
         <p:spPr/>
         <p:txBody>
           <a:bodyPr>
-            <a:normAutofit fontScale="85000" lnSpcReduction="20000"/>
+            <a:normAutofit/>
           </a:bodyPr>
           <a:lstStyle/>
           <a:p>
             <a:r>
+              <a:rPr lang="zh-TW" altLang="en-US" dirty="0" smtClean="0"/>
+              <a:t>點擊周邊區域之景點後會使用</a:t>
+            </a:r>
+            <a:r>
+              <a:rPr lang="en-US" altLang="zh-TW" dirty="0" err="1" smtClean="0"/>
+              <a:t>google</a:t>
+            </a:r>
+            <a:r>
               <a:rPr lang="en-US" altLang="zh-TW" dirty="0" smtClean="0"/>
-              <a:t>Node.js server</a:t>
+              <a:t> map API</a:t>
             </a:r>
             <a:r>
               <a:rPr lang="zh-TW" altLang="en-US" dirty="0" smtClean="0"/>
-              <a:t>在將資料回給前端時若是非同步沒處理好會遇到</a:t>
-            </a:r>
-            <a:r>
-              <a:rPr lang="en-US" altLang="zh-TW" dirty="0" smtClean="0"/>
-              <a:t>write after end</a:t>
-            </a:r>
-            <a:r>
-              <a:rPr lang="zh-TW" altLang="en-US" dirty="0" smtClean="0"/>
-              <a:t>的問題，必須設計好整體流程來避免</a:t>
+              <a:t>進行路徑規劃</a:t>
             </a:r>
             <a:endParaRPr lang="en-US" altLang="zh-TW" dirty="0" smtClean="0"/>
           </a:p>
-          <a:p>
-            <a:r>
-              <a:rPr lang="zh-TW" altLang="en-US" dirty="0" smtClean="0"/>
-              <a:t>原本想以</a:t>
-            </a:r>
-            <a:r>
-              <a:rPr lang="en-US" altLang="zh-TW" dirty="0" smtClean="0"/>
-              <a:t>xml parser</a:t>
-            </a:r>
-            <a:r>
-              <a:rPr lang="zh-TW" altLang="en-US" dirty="0" smtClean="0"/>
-              <a:t>同時處理</a:t>
-            </a:r>
-            <a:r>
-              <a:rPr lang="en-US" altLang="zh-TW" dirty="0" smtClean="0"/>
-              <a:t>html</a:t>
-            </a:r>
-            <a:r>
-              <a:rPr lang="zh-TW" altLang="en-US" dirty="0" smtClean="0"/>
-              <a:t>與</a:t>
-            </a:r>
-            <a:r>
-              <a:rPr lang="en-US" altLang="zh-TW" dirty="0" smtClean="0"/>
-              <a:t>xml</a:t>
-            </a:r>
-            <a:r>
-              <a:rPr lang="zh-TW" altLang="en-US" dirty="0" smtClean="0"/>
-              <a:t>的資料，但發現中央氣象局的網頁</a:t>
-            </a:r>
-            <a:r>
-              <a:rPr lang="en-US" altLang="zh-TW" dirty="0" smtClean="0"/>
-              <a:t>html</a:t>
-            </a:r>
-            <a:r>
-              <a:rPr lang="zh-TW" altLang="en-US" dirty="0" smtClean="0"/>
-              <a:t>寫法並不符合</a:t>
-            </a:r>
-            <a:r>
-              <a:rPr lang="en-US" altLang="zh-TW" dirty="0" smtClean="0"/>
-              <a:t>xml</a:t>
-            </a:r>
-            <a:r>
-              <a:rPr lang="zh-TW" altLang="en-US" dirty="0" smtClean="0"/>
-              <a:t>的標準，最後使用</a:t>
-            </a:r>
-            <a:r>
-              <a:rPr lang="en-US" altLang="zh-TW" dirty="0" err="1" smtClean="0"/>
-              <a:t>himalaya</a:t>
-            </a:r>
-            <a:r>
-              <a:rPr lang="zh-TW" altLang="en-US" dirty="0" smtClean="0"/>
-              <a:t>套件進行</a:t>
-            </a:r>
-            <a:r>
-              <a:rPr lang="en-US" altLang="zh-TW" dirty="0" smtClean="0"/>
-              <a:t>html</a:t>
-            </a:r>
-            <a:r>
-              <a:rPr lang="zh-TW" altLang="en-US" dirty="0" smtClean="0"/>
-              <a:t>格式資料的處理</a:t>
-            </a:r>
-            <a:endParaRPr lang="en-US" altLang="zh-TW" dirty="0" smtClean="0"/>
-          </a:p>
-          <a:p>
-            <a:r>
-              <a:rPr lang="zh-TW" altLang="en-US" dirty="0" smtClean="0"/>
-              <a:t>紀錄地點功能，考量當時還未使用資料庫，所以選擇使用</a:t>
-            </a:r>
-            <a:r>
-              <a:rPr lang="en-US" altLang="zh-TW" dirty="0" smtClean="0"/>
-              <a:t>Cookie</a:t>
-            </a:r>
-            <a:r>
-              <a:rPr lang="zh-TW" altLang="en-US" dirty="0" smtClean="0"/>
-              <a:t>方式紀錄。</a:t>
-            </a:r>
-            <a:endParaRPr lang="en-US" altLang="zh-TW" dirty="0" smtClean="0"/>
-          </a:p>
-          <a:p>
-            <a:r>
-              <a:rPr lang="zh-TW" altLang="en-US" dirty="0" smtClean="0"/>
-              <a:t>後端選擇</a:t>
-            </a:r>
-            <a:r>
-              <a:rPr lang="en-US" altLang="zh-TW" dirty="0" smtClean="0"/>
-              <a:t>Node.js</a:t>
-            </a:r>
-            <a:r>
-              <a:rPr lang="zh-TW" altLang="en-US" dirty="0" smtClean="0"/>
-              <a:t>開發後，原本打算搭配</a:t>
-            </a:r>
-            <a:r>
-              <a:rPr lang="en-US" altLang="zh-TW" dirty="0" smtClean="0"/>
-              <a:t>MSSQL</a:t>
-            </a:r>
-            <a:r>
-              <a:rPr lang="zh-TW" altLang="en-US" dirty="0" smtClean="0"/>
-              <a:t>，經過詳細考量，資料大部分非固定表格模式、關聯性低，格式以</a:t>
-            </a:r>
-            <a:r>
-              <a:rPr lang="en-US" altLang="zh-TW" dirty="0" smtClean="0"/>
-              <a:t>JSON</a:t>
-            </a:r>
-            <a:r>
-              <a:rPr lang="zh-TW" altLang="en-US" dirty="0" smtClean="0"/>
-              <a:t>、</a:t>
-            </a:r>
-            <a:r>
-              <a:rPr lang="en-US" altLang="zh-TW" dirty="0" smtClean="0"/>
-              <a:t>XML</a:t>
-            </a:r>
-            <a:r>
-              <a:rPr lang="zh-TW" altLang="en-US" dirty="0" smtClean="0"/>
-              <a:t>資料為主，所以最終選擇</a:t>
-            </a:r>
-            <a:r>
-              <a:rPr lang="en-US" altLang="zh-TW" dirty="0" err="1" smtClean="0"/>
-              <a:t>NoSQL</a:t>
-            </a:r>
-            <a:r>
-              <a:rPr lang="en-US" altLang="zh-TW" dirty="0" smtClean="0"/>
-              <a:t>(</a:t>
-            </a:r>
-            <a:r>
-              <a:rPr lang="en-US" altLang="zh-TW" dirty="0" err="1" smtClean="0"/>
-              <a:t>mongoDB</a:t>
-            </a:r>
-            <a:r>
-              <a:rPr lang="en-US" altLang="zh-TW" dirty="0" smtClean="0"/>
-              <a:t>)</a:t>
-            </a:r>
-            <a:r>
-              <a:rPr lang="zh-TW" altLang="en-US" dirty="0" smtClean="0"/>
-              <a:t>資料庫。</a:t>
-            </a:r>
-            <a:endParaRPr lang="en-US" altLang="zh-TW" dirty="0" smtClean="0"/>
-          </a:p>
-          <a:p>
-            <a:endParaRPr lang="en-US" altLang="zh-TW" dirty="0" smtClean="0"/>
-          </a:p>
-          <a:p>
-            <a:endParaRPr lang="en-US" altLang="zh-TW" dirty="0" smtClean="0"/>
-          </a:p>
-          <a:p>
-            <a:endParaRPr lang="en-US" altLang="zh-TW" dirty="0" smtClean="0"/>
-          </a:p>
-          <a:p>
-            <a:endParaRPr lang="en-US" altLang="zh-TW" dirty="0" smtClean="0"/>
-          </a:p>
-          <a:p>
-            <a:endParaRPr lang="en-US" altLang="zh-TW" dirty="0" smtClean="0"/>
-          </a:p>
-          <a:p>
-            <a:endParaRPr lang="zh-TW" altLang="en-US" dirty="0"/>
-          </a:p>
-        </p:txBody>
-      </p:sp>
+        </p:txBody>
+      </p:sp>
+      <p:pic>
+        <p:nvPicPr>
+          <p:cNvPr id="4098" name="Picture 2"/>
+          <p:cNvPicPr>
+            <a:picLocks noChangeAspect="1" noChangeArrowheads="1"/>
+          </p:cNvPicPr>
+          <p:nvPr/>
+        </p:nvPicPr>
+        <p:blipFill>
+          <a:blip r:embed="rId2" cstate="print"/>
+          <a:srcRect/>
+          <a:stretch>
+            <a:fillRect/>
+          </a:stretch>
+        </p:blipFill>
+        <p:spPr bwMode="auto">
+          <a:xfrm>
+            <a:off x="179512" y="2564904"/>
+            <a:ext cx="6381016" cy="3456384"/>
+          </a:xfrm>
+          <a:prstGeom prst="rect">
+            <a:avLst/>
+          </a:prstGeom>
+          <a:noFill/>
+          <a:ln w="9525">
+            <a:noFill/>
+            <a:miter lim="800000"/>
+            <a:headEnd/>
+            <a:tailEnd/>
+          </a:ln>
+        </p:spPr>
+      </p:pic>
+      <p:pic>
+        <p:nvPicPr>
+          <p:cNvPr id="4099" name="Picture 3"/>
+          <p:cNvPicPr>
+            <a:picLocks noChangeAspect="1" noChangeArrowheads="1"/>
+          </p:cNvPicPr>
+          <p:nvPr/>
+        </p:nvPicPr>
+        <p:blipFill>
+          <a:blip r:embed="rId3" cstate="print"/>
+          <a:srcRect/>
+          <a:stretch>
+            <a:fillRect/>
+          </a:stretch>
+        </p:blipFill>
+        <p:spPr bwMode="auto">
+          <a:xfrm>
+            <a:off x="6738786" y="2564904"/>
+            <a:ext cx="2225702" cy="3960440"/>
+          </a:xfrm>
+          <a:prstGeom prst="rect">
+            <a:avLst/>
+          </a:prstGeom>
+          <a:noFill/>
+          <a:ln w="9525">
+            <a:noFill/>
+            <a:miter lim="800000"/>
+            <a:headEnd/>
+            <a:tailEnd/>
+          </a:ln>
+        </p:spPr>
+      </p:pic>
     </p:spTree>
   </p:cSld>
   <p:clrMapOvr>

</xml_diff>

<commit_message>
1. Remove route when user remove favorite location 2. Update slide
</commit_message>
<xml_diff>
--- a/HtmlProject/NodejsCompleteServer/Slide/天氣概況綜合資訊站 - 3rd stage.pptx
+++ b/HtmlProject/NodejsCompleteServer/Slide/天氣概況綜合資訊站 - 3rd stage.pptx
@@ -14,10 +14,13 @@
     <p:sldId id="273" r:id="rId8"/>
     <p:sldId id="270" r:id="rId9"/>
     <p:sldId id="275" r:id="rId10"/>
-    <p:sldId id="271" r:id="rId11"/>
-    <p:sldId id="260" r:id="rId12"/>
-    <p:sldId id="272" r:id="rId13"/>
-    <p:sldId id="261" r:id="rId14"/>
+    <p:sldId id="276" r:id="rId11"/>
+    <p:sldId id="277" r:id="rId12"/>
+    <p:sldId id="278" r:id="rId13"/>
+    <p:sldId id="271" r:id="rId14"/>
+    <p:sldId id="260" r:id="rId15"/>
+    <p:sldId id="272" r:id="rId16"/>
+    <p:sldId id="261" r:id="rId17"/>
   </p:sldIdLst>
   <p:sldSz cx="9144000" cy="6858000" type="screen4x3"/>
   <p:notesSz cx="6858000" cy="9144000"/>
@@ -295,7 +298,7 @@
             <a:fld id="{BCE07298-A4E3-46A5-ACD8-E4B313F14FA0}" type="datetimeFigureOut">
               <a:rPr lang="zh-TW" altLang="en-US" smtClean="0"/>
               <a:pPr/>
-              <a:t>2016/8/29</a:t>
+              <a:t>2016/8/30</a:t>
             </a:fld>
             <a:endParaRPr lang="zh-TW" altLang="en-US"/>
           </a:p>
@@ -467,7 +470,7 @@
             <a:fld id="{BCE07298-A4E3-46A5-ACD8-E4B313F14FA0}" type="datetimeFigureOut">
               <a:rPr lang="zh-TW" altLang="en-US" smtClean="0"/>
               <a:pPr/>
-              <a:t>2016/8/29</a:t>
+              <a:t>2016/8/30</a:t>
             </a:fld>
             <a:endParaRPr lang="zh-TW" altLang="en-US"/>
           </a:p>
@@ -644,7 +647,7 @@
             <a:fld id="{BCE07298-A4E3-46A5-ACD8-E4B313F14FA0}" type="datetimeFigureOut">
               <a:rPr lang="zh-TW" altLang="en-US" smtClean="0"/>
               <a:pPr/>
-              <a:t>2016/8/29</a:t>
+              <a:t>2016/8/30</a:t>
             </a:fld>
             <a:endParaRPr lang="zh-TW" altLang="en-US"/>
           </a:p>
@@ -811,7 +814,7 @@
             <a:fld id="{BCE07298-A4E3-46A5-ACD8-E4B313F14FA0}" type="datetimeFigureOut">
               <a:rPr lang="zh-TW" altLang="en-US" smtClean="0"/>
               <a:pPr/>
-              <a:t>2016/8/29</a:t>
+              <a:t>2016/8/30</a:t>
             </a:fld>
             <a:endParaRPr lang="zh-TW" altLang="en-US"/>
           </a:p>
@@ -1047,7 +1050,7 @@
             <a:fld id="{BCE07298-A4E3-46A5-ACD8-E4B313F14FA0}" type="datetimeFigureOut">
               <a:rPr lang="zh-TW" altLang="en-US" smtClean="0"/>
               <a:pPr/>
-              <a:t>2016/8/29</a:t>
+              <a:t>2016/8/30</a:t>
             </a:fld>
             <a:endParaRPr lang="zh-TW" altLang="en-US"/>
           </a:p>
@@ -1345,7 +1348,7 @@
             <a:fld id="{BCE07298-A4E3-46A5-ACD8-E4B313F14FA0}" type="datetimeFigureOut">
               <a:rPr lang="zh-TW" altLang="en-US" smtClean="0"/>
               <a:pPr/>
-              <a:t>2016/8/29</a:t>
+              <a:t>2016/8/30</a:t>
             </a:fld>
             <a:endParaRPr lang="zh-TW" altLang="en-US"/>
           </a:p>
@@ -1731,7 +1734,7 @@
             <a:fld id="{BCE07298-A4E3-46A5-ACD8-E4B313F14FA0}" type="datetimeFigureOut">
               <a:rPr lang="zh-TW" altLang="en-US" smtClean="0"/>
               <a:pPr/>
-              <a:t>2016/8/29</a:t>
+              <a:t>2016/8/30</a:t>
             </a:fld>
             <a:endParaRPr lang="zh-TW" altLang="en-US"/>
           </a:p>
@@ -1906,7 +1909,7 @@
             <a:fld id="{BCE07298-A4E3-46A5-ACD8-E4B313F14FA0}" type="datetimeFigureOut">
               <a:rPr lang="zh-TW" altLang="en-US" smtClean="0"/>
               <a:pPr/>
-              <a:t>2016/8/29</a:t>
+              <a:t>2016/8/30</a:t>
             </a:fld>
             <a:endParaRPr lang="zh-TW" altLang="en-US"/>
           </a:p>
@@ -1998,7 +2001,7 @@
             <a:fld id="{BCE07298-A4E3-46A5-ACD8-E4B313F14FA0}" type="datetimeFigureOut">
               <a:rPr lang="zh-TW" altLang="en-US" smtClean="0"/>
               <a:pPr/>
-              <a:t>2016/8/29</a:t>
+              <a:t>2016/8/30</a:t>
             </a:fld>
             <a:endParaRPr lang="zh-TW" altLang="en-US"/>
           </a:p>
@@ -2295,7 +2298,7 @@
             <a:fld id="{BCE07298-A4E3-46A5-ACD8-E4B313F14FA0}" type="datetimeFigureOut">
               <a:rPr lang="zh-TW" altLang="en-US" smtClean="0"/>
               <a:pPr/>
-              <a:t>2016/8/29</a:t>
+              <a:t>2016/8/30</a:t>
             </a:fld>
             <a:endParaRPr lang="zh-TW" altLang="en-US"/>
           </a:p>
@@ -2431,7 +2434,7 @@
             <a:fld id="{BCE07298-A4E3-46A5-ACD8-E4B313F14FA0}" type="datetimeFigureOut">
               <a:rPr lang="zh-TW" altLang="en-US" smtClean="0"/>
               <a:pPr/>
-              <a:t>2016/8/29</a:t>
+              <a:t>2016/8/30</a:t>
             </a:fld>
             <a:endParaRPr lang="zh-TW" altLang="en-US"/>
           </a:p>
@@ -2736,7 +2739,7 @@
             <a:fld id="{BCE07298-A4E3-46A5-ACD8-E4B313F14FA0}" type="datetimeFigureOut">
               <a:rPr lang="zh-TW" altLang="en-US" smtClean="0"/>
               <a:pPr/>
-              <a:t>2016/8/29</a:t>
+              <a:t>2016/8/30</a:t>
             </a:fld>
             <a:endParaRPr lang="zh-TW" altLang="en-US"/>
           </a:p>
@@ -3383,9 +3386,9 @@
           <a:p>
             <a:r>
               <a:rPr lang="zh-TW" altLang="en-US" dirty="0" smtClean="0"/>
-              <a:t>問題及解決方式</a:t>
-            </a:r>
-            <a:endParaRPr lang="zh-TW" altLang="en-US" dirty="0"/>
+              <a:t>登入帳號</a:t>
+            </a:r>
+            <a:endParaRPr lang="en-US" altLang="zh-TW" dirty="0" smtClean="0"/>
           </a:p>
         </p:txBody>
       </p:sp>
@@ -3402,185 +3405,66 @@
         <p:spPr/>
         <p:txBody>
           <a:bodyPr>
-            <a:normAutofit fontScale="85000" lnSpcReduction="20000"/>
+            <a:normAutofit/>
           </a:bodyPr>
           <a:lstStyle/>
           <a:p>
             <a:r>
+              <a:rPr lang="zh-TW" altLang="en-US" dirty="0" smtClean="0"/>
+              <a:t>提供以</a:t>
+            </a:r>
+            <a:r>
               <a:rPr lang="en-US" altLang="zh-TW" dirty="0" smtClean="0"/>
-              <a:t>Node.js server</a:t>
-            </a:r>
-            <a:r>
-              <a:rPr lang="zh-TW" altLang="en-US" dirty="0" smtClean="0"/>
-              <a:t>在將資料回給前端時若是非同步沒處理好會遇到</a:t>
-            </a:r>
-            <a:r>
-              <a:rPr lang="en-US" altLang="zh-TW" dirty="0" smtClean="0"/>
-              <a:t>write after end</a:t>
-            </a:r>
-            <a:r>
-              <a:rPr lang="zh-TW" altLang="en-US" dirty="0" smtClean="0"/>
-              <a:t>的問題，必須設計好整體流程來避免</a:t>
+              <a:t>Google</a:t>
+            </a:r>
+            <a:r>
+              <a:rPr lang="zh-TW" altLang="en-US" dirty="0" smtClean="0"/>
+              <a:t>或是</a:t>
+            </a:r>
+            <a:r>
+              <a:rPr lang="en-US" altLang="zh-TW" dirty="0" err="1" smtClean="0"/>
+              <a:t>Facebook</a:t>
+            </a:r>
+            <a:r>
+              <a:rPr lang="zh-TW" altLang="en-US" dirty="0" smtClean="0"/>
+              <a:t>的帳號登入</a:t>
             </a:r>
             <a:endParaRPr lang="en-US" altLang="zh-TW" dirty="0" smtClean="0"/>
           </a:p>
-          <a:p>
-            <a:r>
-              <a:rPr lang="zh-TW" altLang="en-US" dirty="0" smtClean="0"/>
-              <a:t>原本想以</a:t>
-            </a:r>
-            <a:r>
-              <a:rPr lang="en-US" altLang="zh-TW" dirty="0" smtClean="0"/>
-              <a:t>xml parser</a:t>
-            </a:r>
-            <a:r>
-              <a:rPr lang="zh-TW" altLang="en-US" dirty="0" smtClean="0"/>
-              <a:t>同時處理</a:t>
-            </a:r>
-            <a:r>
-              <a:rPr lang="en-US" altLang="zh-TW" dirty="0" smtClean="0"/>
-              <a:t>html</a:t>
-            </a:r>
-            <a:r>
-              <a:rPr lang="zh-TW" altLang="en-US" dirty="0" smtClean="0"/>
-              <a:t>與</a:t>
-            </a:r>
-            <a:r>
-              <a:rPr lang="en-US" altLang="zh-TW" dirty="0" smtClean="0"/>
-              <a:t>xml</a:t>
-            </a:r>
-            <a:r>
-              <a:rPr lang="zh-TW" altLang="en-US" dirty="0" smtClean="0"/>
-              <a:t>的資料，但發現中央氣象局的網頁</a:t>
-            </a:r>
-            <a:r>
-              <a:rPr lang="en-US" altLang="zh-TW" dirty="0" smtClean="0"/>
-              <a:t>html</a:t>
-            </a:r>
-            <a:r>
-              <a:rPr lang="zh-TW" altLang="en-US" dirty="0" smtClean="0"/>
-              <a:t>寫法並不符合</a:t>
-            </a:r>
-            <a:r>
-              <a:rPr lang="en-US" altLang="zh-TW" dirty="0" smtClean="0"/>
-              <a:t>xml</a:t>
-            </a:r>
-            <a:r>
-              <a:rPr lang="zh-TW" altLang="en-US" dirty="0" smtClean="0"/>
-              <a:t>的標準，最後使用</a:t>
-            </a:r>
-            <a:r>
-              <a:rPr lang="en-US" altLang="zh-TW" dirty="0" err="1" smtClean="0"/>
-              <a:t>himalaya</a:t>
-            </a:r>
-            <a:r>
-              <a:rPr lang="zh-TW" altLang="en-US" dirty="0" smtClean="0"/>
-              <a:t>套件進行</a:t>
-            </a:r>
-            <a:r>
-              <a:rPr lang="en-US" altLang="zh-TW" dirty="0" smtClean="0"/>
-              <a:t>html</a:t>
-            </a:r>
-            <a:r>
-              <a:rPr lang="zh-TW" altLang="en-US" dirty="0" smtClean="0"/>
-              <a:t>格式資料的處理</a:t>
-            </a:r>
-            <a:endParaRPr lang="en-US" altLang="zh-TW" dirty="0" smtClean="0"/>
-          </a:p>
-          <a:p>
-            <a:r>
-              <a:rPr lang="zh-TW" altLang="en-US" dirty="0" smtClean="0"/>
-              <a:t>紀錄地點功能，考量當時還未使用資料庫，所以選擇使用</a:t>
-            </a:r>
-            <a:r>
-              <a:rPr lang="en-US" altLang="zh-TW" dirty="0" smtClean="0"/>
-              <a:t>Cookie</a:t>
-            </a:r>
-            <a:r>
-              <a:rPr lang="zh-TW" altLang="en-US" dirty="0" smtClean="0"/>
-              <a:t>方式紀錄。</a:t>
-            </a:r>
-            <a:endParaRPr lang="en-US" altLang="zh-TW" dirty="0" smtClean="0"/>
-          </a:p>
-          <a:p>
-            <a:r>
-              <a:rPr lang="zh-TW" altLang="en-US" dirty="0" smtClean="0"/>
-              <a:t>後端選擇</a:t>
-            </a:r>
-            <a:r>
-              <a:rPr lang="en-US" altLang="zh-TW" dirty="0" smtClean="0"/>
-              <a:t>Node.js</a:t>
-            </a:r>
-            <a:r>
-              <a:rPr lang="zh-TW" altLang="en-US" dirty="0" smtClean="0"/>
-              <a:t>開發後，原本打算搭配</a:t>
-            </a:r>
-            <a:r>
-              <a:rPr lang="en-US" altLang="zh-TW" dirty="0" smtClean="0"/>
-              <a:t>MSSQL</a:t>
-            </a:r>
-            <a:r>
-              <a:rPr lang="zh-TW" altLang="en-US" dirty="0" smtClean="0"/>
-              <a:t>，經過詳細考量，資料大部分非固定表格模式、關聯性低，格式以</a:t>
-            </a:r>
-            <a:r>
-              <a:rPr lang="en-US" altLang="zh-TW" dirty="0" smtClean="0"/>
-              <a:t>JSON</a:t>
-            </a:r>
-            <a:r>
-              <a:rPr lang="zh-TW" altLang="en-US" dirty="0" smtClean="0"/>
-              <a:t>、</a:t>
-            </a:r>
-            <a:r>
-              <a:rPr lang="en-US" altLang="zh-TW" dirty="0" smtClean="0"/>
-              <a:t>XML</a:t>
-            </a:r>
-            <a:r>
-              <a:rPr lang="zh-TW" altLang="en-US" dirty="0" smtClean="0"/>
-              <a:t>資料為主，所以最終選擇</a:t>
-            </a:r>
-            <a:r>
-              <a:rPr lang="en-US" altLang="zh-TW" dirty="0" err="1" smtClean="0"/>
-              <a:t>NoSQL</a:t>
-            </a:r>
-            <a:r>
-              <a:rPr lang="en-US" altLang="zh-TW" dirty="0" smtClean="0"/>
-              <a:t>(</a:t>
-            </a:r>
-            <a:r>
-              <a:rPr lang="en-US" altLang="zh-TW" dirty="0" err="1" smtClean="0"/>
-              <a:t>mongoDB</a:t>
-            </a:r>
-            <a:r>
-              <a:rPr lang="en-US" altLang="zh-TW" dirty="0" smtClean="0"/>
-              <a:t>)</a:t>
-            </a:r>
-            <a:r>
-              <a:rPr lang="zh-TW" altLang="en-US" dirty="0" smtClean="0"/>
-              <a:t>資料庫。</a:t>
-            </a:r>
-            <a:endParaRPr lang="en-US" altLang="zh-TW" dirty="0" smtClean="0"/>
-          </a:p>
-          <a:p>
-            <a:endParaRPr lang="en-US" altLang="zh-TW" dirty="0" smtClean="0"/>
-          </a:p>
-          <a:p>
-            <a:endParaRPr lang="en-US" altLang="zh-TW" dirty="0" smtClean="0"/>
-          </a:p>
-          <a:p>
-            <a:endParaRPr lang="en-US" altLang="zh-TW" dirty="0" smtClean="0"/>
-          </a:p>
-          <a:p>
-            <a:endParaRPr lang="en-US" altLang="zh-TW" dirty="0" smtClean="0"/>
-          </a:p>
-          <a:p>
-            <a:endParaRPr lang="en-US" altLang="zh-TW" dirty="0" smtClean="0"/>
-          </a:p>
-          <a:p>
-            <a:endParaRPr lang="zh-TW" altLang="en-US" dirty="0"/>
-          </a:p>
-        </p:txBody>
-      </p:sp>
+        </p:txBody>
+      </p:sp>
+      <p:pic>
+        <p:nvPicPr>
+          <p:cNvPr id="4099" name="Picture 3"/>
+          <p:cNvPicPr>
+            <a:picLocks noChangeAspect="1" noChangeArrowheads="1"/>
+          </p:cNvPicPr>
+          <p:nvPr/>
+        </p:nvPicPr>
+        <p:blipFill>
+          <a:blip r:embed="rId2" cstate="print"/>
+          <a:srcRect/>
+          <a:stretch>
+            <a:fillRect/>
+          </a:stretch>
+        </p:blipFill>
+        <p:spPr bwMode="auto">
+          <a:xfrm>
+            <a:off x="1259632" y="2132856"/>
+            <a:ext cx="6624736" cy="4436284"/>
+          </a:xfrm>
+          <a:prstGeom prst="rect">
+            <a:avLst/>
+          </a:prstGeom>
+          <a:noFill/>
+          <a:ln w="9525">
+            <a:noFill/>
+            <a:miter lim="800000"/>
+            <a:headEnd/>
+            <a:tailEnd/>
+          </a:ln>
+        </p:spPr>
+      </p:pic>
     </p:spTree>
   </p:cSld>
   <p:clrMapOvr>
@@ -3597,6 +3481,373 @@
 </file>
 
 <file path=ppt/slides/slide11.xml><?xml version="1.0" encoding="utf-8"?>
+<p:sld xmlns:a="http://schemas.openxmlformats.org/drawingml/2006/main" xmlns:r="http://schemas.openxmlformats.org/officeDocument/2006/relationships" xmlns:p="http://schemas.openxmlformats.org/presentationml/2006/main">
+  <p:cSld>
+    <p:spTree>
+      <p:nvGrpSpPr>
+        <p:cNvPr id="1" name=""/>
+        <p:cNvGrpSpPr/>
+        <p:nvPr/>
+      </p:nvGrpSpPr>
+      <p:grpSpPr>
+        <a:xfrm>
+          <a:off x="0" y="0"/>
+          <a:ext cx="0" cy="0"/>
+          <a:chOff x="0" y="0"/>
+          <a:chExt cx="0" cy="0"/>
+        </a:xfrm>
+      </p:grpSpPr>
+      <p:sp>
+        <p:nvSpPr>
+          <p:cNvPr id="2" name="標題 1"/>
+          <p:cNvSpPr>
+            <a:spLocks noGrp="1"/>
+          </p:cNvSpPr>
+          <p:nvPr>
+            <p:ph type="title"/>
+          </p:nvPr>
+        </p:nvSpPr>
+        <p:spPr/>
+        <p:txBody>
+          <a:bodyPr/>
+          <a:lstStyle/>
+          <a:p>
+            <a:r>
+              <a:rPr lang="zh-TW" altLang="en-US" dirty="0" smtClean="0"/>
+              <a:t>紀錄最愛地點</a:t>
+            </a:r>
+            <a:endParaRPr lang="en-US" altLang="zh-TW" dirty="0" smtClean="0"/>
+          </a:p>
+        </p:txBody>
+      </p:sp>
+      <p:sp>
+        <p:nvSpPr>
+          <p:cNvPr id="3" name="內容版面配置區 2"/>
+          <p:cNvSpPr>
+            <a:spLocks noGrp="1"/>
+          </p:cNvSpPr>
+          <p:nvPr>
+            <p:ph idx="1"/>
+          </p:nvPr>
+        </p:nvSpPr>
+        <p:spPr/>
+        <p:txBody>
+          <a:bodyPr>
+            <a:normAutofit/>
+          </a:bodyPr>
+          <a:lstStyle/>
+          <a:p>
+            <a:r>
+              <a:rPr lang="zh-TW" altLang="en-US" dirty="0" smtClean="0"/>
+              <a:t>使用者能夠以帳號為依據進行個人最愛地點之紀錄</a:t>
+            </a:r>
+            <a:endParaRPr lang="en-US" altLang="zh-TW" dirty="0" smtClean="0"/>
+          </a:p>
+          <a:p>
+            <a:r>
+              <a:rPr lang="en-US" altLang="zh-TW" dirty="0" smtClean="0"/>
+              <a:t>Server</a:t>
+            </a:r>
+            <a:r>
+              <a:rPr lang="zh-TW" altLang="en-US" dirty="0" smtClean="0"/>
+              <a:t>端會以登入的帳號為依據</a:t>
+            </a:r>
+            <a:r>
+              <a:rPr lang="zh-TW" altLang="en-US" dirty="0" smtClean="0"/>
+              <a:t>將最愛</a:t>
+            </a:r>
+            <a:r>
+              <a:rPr lang="zh-TW" altLang="en-US" dirty="0" smtClean="0"/>
+              <a:t>地點分別紀錄於</a:t>
+            </a:r>
+            <a:r>
+              <a:rPr lang="en-US" altLang="zh-TW" dirty="0" smtClean="0"/>
+              <a:t>mongo</a:t>
+            </a:r>
+            <a:r>
+              <a:rPr lang="zh-TW" altLang="en-US" dirty="0" smtClean="0"/>
+              <a:t>資料庫中</a:t>
+            </a:r>
+            <a:endParaRPr lang="en-US" altLang="zh-TW" dirty="0" smtClean="0"/>
+          </a:p>
+          <a:p>
+            <a:r>
+              <a:rPr lang="zh-TW" altLang="en-US" dirty="0" smtClean="0"/>
+              <a:t>在不同裝置</a:t>
+            </a:r>
+            <a:r>
+              <a:rPr lang="en-US" altLang="zh-TW" dirty="0" smtClean="0"/>
+              <a:t>/</a:t>
+            </a:r>
+            <a:r>
+              <a:rPr lang="zh-TW" altLang="en-US" dirty="0" smtClean="0"/>
+              <a:t>瀏覽器中若以相同帳號登入可以看到相同的最愛地點</a:t>
+            </a:r>
+            <a:endParaRPr lang="en-US" altLang="zh-TW" dirty="0" smtClean="0"/>
+          </a:p>
+        </p:txBody>
+      </p:sp>
+    </p:spTree>
+  </p:cSld>
+  <p:clrMapOvr>
+    <a:masterClrMapping/>
+  </p:clrMapOvr>
+  <p:timing>
+    <p:tnLst>
+      <p:par>
+        <p:cTn id="1" dur="indefinite" restart="never" nodeType="tmRoot"/>
+      </p:par>
+    </p:tnLst>
+  </p:timing>
+</p:sld>
+</file>
+
+<file path=ppt/slides/slide12.xml><?xml version="1.0" encoding="utf-8"?>
+<p:sld xmlns:a="http://schemas.openxmlformats.org/drawingml/2006/main" xmlns:r="http://schemas.openxmlformats.org/officeDocument/2006/relationships" xmlns:p="http://schemas.openxmlformats.org/presentationml/2006/main">
+  <p:cSld>
+    <p:spTree>
+      <p:nvGrpSpPr>
+        <p:cNvPr id="1" name=""/>
+        <p:cNvGrpSpPr/>
+        <p:nvPr/>
+      </p:nvGrpSpPr>
+      <p:grpSpPr>
+        <a:xfrm>
+          <a:off x="0" y="0"/>
+          <a:ext cx="0" cy="0"/>
+          <a:chOff x="0" y="0"/>
+          <a:chExt cx="0" cy="0"/>
+        </a:xfrm>
+      </p:grpSpPr>
+      <p:sp>
+        <p:nvSpPr>
+          <p:cNvPr id="2" name="標題 1"/>
+          <p:cNvSpPr>
+            <a:spLocks noGrp="1"/>
+          </p:cNvSpPr>
+          <p:nvPr>
+            <p:ph type="title"/>
+          </p:nvPr>
+        </p:nvSpPr>
+        <p:spPr/>
+        <p:txBody>
+          <a:bodyPr/>
+          <a:lstStyle/>
+          <a:p>
+            <a:r>
+              <a:rPr lang="zh-TW" altLang="en-US" dirty="0" smtClean="0"/>
+              <a:t>提示訊息方式</a:t>
+            </a:r>
+            <a:endParaRPr lang="en-US" altLang="zh-TW" dirty="0" smtClean="0"/>
+          </a:p>
+        </p:txBody>
+      </p:sp>
+      <p:sp>
+        <p:nvSpPr>
+          <p:cNvPr id="3" name="內容版面配置區 2"/>
+          <p:cNvSpPr>
+            <a:spLocks noGrp="1"/>
+          </p:cNvSpPr>
+          <p:nvPr>
+            <p:ph idx="1"/>
+          </p:nvPr>
+        </p:nvSpPr>
+        <p:spPr/>
+        <p:txBody>
+          <a:bodyPr>
+            <a:normAutofit/>
+          </a:bodyPr>
+          <a:lstStyle/>
+          <a:p>
+            <a:r>
+              <a:rPr lang="zh-TW" altLang="en-US" dirty="0" smtClean="0"/>
+              <a:t>以畫面中上跳出之訊息取代預設的</a:t>
+            </a:r>
+            <a:r>
+              <a:rPr lang="en-US" altLang="zh-TW" dirty="0" smtClean="0"/>
+              <a:t>alert</a:t>
+            </a:r>
+            <a:r>
+              <a:rPr lang="zh-TW" altLang="en-US" dirty="0" smtClean="0"/>
+              <a:t>，並且加入動畫效果</a:t>
+            </a:r>
+            <a:endParaRPr lang="en-US" altLang="zh-TW" dirty="0" smtClean="0"/>
+          </a:p>
+        </p:txBody>
+      </p:sp>
+      <p:pic>
+        <p:nvPicPr>
+          <p:cNvPr id="5123" name="Picture 3"/>
+          <p:cNvPicPr>
+            <a:picLocks noChangeAspect="1" noChangeArrowheads="1"/>
+          </p:cNvPicPr>
+          <p:nvPr/>
+        </p:nvPicPr>
+        <p:blipFill>
+          <a:blip r:embed="rId2" cstate="print"/>
+          <a:srcRect/>
+          <a:stretch>
+            <a:fillRect/>
+          </a:stretch>
+        </p:blipFill>
+        <p:spPr bwMode="auto">
+          <a:xfrm>
+            <a:off x="1547664" y="2564904"/>
+            <a:ext cx="6120680" cy="4098740"/>
+          </a:xfrm>
+          <a:prstGeom prst="rect">
+            <a:avLst/>
+          </a:prstGeom>
+          <a:noFill/>
+          <a:ln w="9525">
+            <a:noFill/>
+            <a:miter lim="800000"/>
+            <a:headEnd/>
+            <a:tailEnd/>
+          </a:ln>
+        </p:spPr>
+      </p:pic>
+    </p:spTree>
+  </p:cSld>
+  <p:clrMapOvr>
+    <a:masterClrMapping/>
+  </p:clrMapOvr>
+  <p:timing>
+    <p:tnLst>
+      <p:par>
+        <p:cTn id="1" dur="indefinite" restart="never" nodeType="tmRoot"/>
+      </p:par>
+    </p:tnLst>
+  </p:timing>
+</p:sld>
+</file>
+
+<file path=ppt/slides/slide13.xml><?xml version="1.0" encoding="utf-8"?>
+<p:sld xmlns:a="http://schemas.openxmlformats.org/drawingml/2006/main" xmlns:r="http://schemas.openxmlformats.org/officeDocument/2006/relationships" xmlns:p="http://schemas.openxmlformats.org/presentationml/2006/main">
+  <p:cSld>
+    <p:spTree>
+      <p:nvGrpSpPr>
+        <p:cNvPr id="1" name=""/>
+        <p:cNvGrpSpPr/>
+        <p:nvPr/>
+      </p:nvGrpSpPr>
+      <p:grpSpPr>
+        <a:xfrm>
+          <a:off x="0" y="0"/>
+          <a:ext cx="0" cy="0"/>
+          <a:chOff x="0" y="0"/>
+          <a:chExt cx="0" cy="0"/>
+        </a:xfrm>
+      </p:grpSpPr>
+      <p:sp>
+        <p:nvSpPr>
+          <p:cNvPr id="2" name="標題 1"/>
+          <p:cNvSpPr>
+            <a:spLocks noGrp="1"/>
+          </p:cNvSpPr>
+          <p:nvPr>
+            <p:ph type="title"/>
+          </p:nvPr>
+        </p:nvSpPr>
+        <p:spPr/>
+        <p:txBody>
+          <a:bodyPr/>
+          <a:lstStyle/>
+          <a:p>
+            <a:r>
+              <a:rPr lang="zh-TW" altLang="en-US" dirty="0" smtClean="0"/>
+              <a:t>問題及解決方式</a:t>
+            </a:r>
+            <a:endParaRPr lang="zh-TW" altLang="en-US" dirty="0"/>
+          </a:p>
+        </p:txBody>
+      </p:sp>
+      <p:sp>
+        <p:nvSpPr>
+          <p:cNvPr id="3" name="內容版面配置區 2"/>
+          <p:cNvSpPr>
+            <a:spLocks noGrp="1"/>
+          </p:cNvSpPr>
+          <p:nvPr>
+            <p:ph idx="1"/>
+          </p:nvPr>
+        </p:nvSpPr>
+        <p:spPr/>
+        <p:txBody>
+          <a:bodyPr>
+            <a:normAutofit/>
+          </a:bodyPr>
+          <a:lstStyle/>
+          <a:p>
+            <a:r>
+              <a:rPr lang="zh-TW" altLang="en-US" dirty="0" smtClean="0"/>
+              <a:t>要</a:t>
+            </a:r>
+            <a:r>
+              <a:rPr lang="zh-TW" altLang="en-US" dirty="0" smtClean="0"/>
+              <a:t>在地圖</a:t>
+            </a:r>
+            <a:r>
+              <a:rPr lang="zh-TW" altLang="en-US" dirty="0" smtClean="0"/>
+              <a:t>上</a:t>
+            </a:r>
+            <a:r>
+              <a:rPr lang="zh-TW" altLang="en-US" dirty="0" smtClean="0"/>
+              <a:t>標定</a:t>
+            </a:r>
+            <a:r>
+              <a:rPr lang="zh-TW" altLang="en-US" dirty="0" smtClean="0"/>
+              <a:t>多個</a:t>
+            </a:r>
+            <a:r>
+              <a:rPr lang="en-US" altLang="zh-TW" dirty="0" smtClean="0"/>
+              <a:t>marker</a:t>
+            </a:r>
+            <a:r>
+              <a:rPr lang="zh-TW" altLang="en-US" dirty="0" smtClean="0"/>
+              <a:t>超過一定數量後會無法標，必須以時間間隔開不能連續標</a:t>
+            </a:r>
+            <a:r>
+              <a:rPr lang="en-US" altLang="zh-TW" dirty="0" smtClean="0"/>
+              <a:t>maker</a:t>
+            </a:r>
+          </a:p>
+          <a:p>
+            <a:endParaRPr lang="en-US" altLang="zh-TW" dirty="0" smtClean="0"/>
+          </a:p>
+          <a:p>
+            <a:endParaRPr lang="en-US" altLang="zh-TW" dirty="0" smtClean="0"/>
+          </a:p>
+          <a:p>
+            <a:endParaRPr lang="en-US" altLang="zh-TW" dirty="0" smtClean="0"/>
+          </a:p>
+          <a:p>
+            <a:endParaRPr lang="en-US" altLang="zh-TW" dirty="0" smtClean="0"/>
+          </a:p>
+          <a:p>
+            <a:endParaRPr lang="en-US" altLang="zh-TW" dirty="0" smtClean="0"/>
+          </a:p>
+          <a:p>
+            <a:endParaRPr lang="zh-TW" altLang="en-US" dirty="0"/>
+          </a:p>
+        </p:txBody>
+      </p:sp>
+    </p:spTree>
+  </p:cSld>
+  <p:clrMapOvr>
+    <a:masterClrMapping/>
+  </p:clrMapOvr>
+  <p:timing>
+    <p:tnLst>
+      <p:par>
+        <p:cTn id="1" dur="indefinite" restart="never" nodeType="tmRoot"/>
+      </p:par>
+    </p:tnLst>
+  </p:timing>
+</p:sld>
+</file>
+
+<file path=ppt/slides/slide14.xml><?xml version="1.0" encoding="utf-8"?>
 <p:sld xmlns:a="http://schemas.openxmlformats.org/drawingml/2006/main" xmlns:r="http://schemas.openxmlformats.org/officeDocument/2006/relationships" xmlns:p="http://schemas.openxmlformats.org/presentationml/2006/main">
   <p:cSld>
     <p:spTree>
@@ -4163,237 +4414,6 @@
           </a:graphicData>
         </a:graphic>
       </p:graphicFrame>
-      <p:sp>
-        <p:nvSpPr>
-          <p:cNvPr id="8" name="文字方塊 7"/>
-          <p:cNvSpPr txBox="1"/>
-          <p:nvPr/>
-        </p:nvSpPr>
-        <p:spPr>
-          <a:xfrm>
-            <a:off x="575048" y="5733256"/>
-            <a:ext cx="8568952" cy="1723549"/>
-          </a:xfrm>
-          <a:prstGeom prst="rect">
-            <a:avLst/>
-          </a:prstGeom>
-          <a:noFill/>
-        </p:spPr>
-        <p:txBody>
-          <a:bodyPr wrap="square" rtlCol="0">
-            <a:spAutoFit/>
-          </a:bodyPr>
-          <a:lstStyle/>
-          <a:p>
-            <a:r>
-              <a:rPr lang="zh-TW" altLang="en-US" sz="3200" dirty="0">
-                <a:solidFill>
-                  <a:schemeClr val="tx2"/>
-                </a:solidFill>
-              </a:rPr>
-              <a:t>分工區分為前端</a:t>
-            </a:r>
-            <a:r>
-              <a:rPr lang="en-US" altLang="zh-TW" sz="3200" dirty="0">
-                <a:solidFill>
-                  <a:schemeClr val="tx2"/>
-                </a:solidFill>
-              </a:rPr>
-              <a:t>UI</a:t>
-            </a:r>
-            <a:r>
-              <a:rPr lang="zh-TW" altLang="en-US" sz="3200" dirty="0">
-                <a:solidFill>
-                  <a:schemeClr val="tx2"/>
-                </a:solidFill>
-              </a:rPr>
-              <a:t>與後端資料</a:t>
-            </a:r>
-            <a:r>
-              <a:rPr lang="zh-TW" altLang="en-US" sz="3200" dirty="0" smtClean="0">
-                <a:solidFill>
-                  <a:schemeClr val="tx2"/>
-                </a:solidFill>
-              </a:rPr>
-              <a:t>取得</a:t>
-            </a:r>
-            <a:endParaRPr lang="en-US" altLang="zh-TW" sz="3200" dirty="0" smtClean="0">
-              <a:solidFill>
-                <a:schemeClr val="tx2"/>
-              </a:solidFill>
-            </a:endParaRPr>
-          </a:p>
-          <a:p>
-            <a:pPr>
-              <a:buFont typeface="Arial" pitchFamily="34" charset="0"/>
-              <a:buChar char="•"/>
-            </a:pPr>
-            <a:r>
-              <a:rPr lang="zh-TW" altLang="en-US" sz="2800" dirty="0" smtClean="0">
-                <a:solidFill>
-                  <a:schemeClr val="tx2"/>
-                </a:solidFill>
-              </a:rPr>
-              <a:t> </a:t>
-            </a:r>
-            <a:r>
-              <a:rPr lang="en-US" altLang="zh-TW" sz="2800" dirty="0" smtClean="0">
-                <a:solidFill>
-                  <a:schemeClr val="tx2"/>
-                </a:solidFill>
-              </a:rPr>
-              <a:t>Morris</a:t>
-            </a:r>
-            <a:r>
-              <a:rPr lang="zh-TW" altLang="en-US" sz="2800" dirty="0" smtClean="0">
-                <a:solidFill>
-                  <a:schemeClr val="tx2"/>
-                </a:solidFill>
-              </a:rPr>
-              <a:t>主要負責</a:t>
-            </a:r>
-            <a:r>
-              <a:rPr lang="zh-TW" altLang="en-US" sz="2800" dirty="0">
-                <a:solidFill>
-                  <a:schemeClr val="tx2"/>
-                </a:solidFill>
-              </a:rPr>
-              <a:t>部分</a:t>
-            </a:r>
-            <a:r>
-              <a:rPr lang="zh-TW" altLang="en-US" sz="2800" dirty="0" smtClean="0">
-                <a:solidFill>
-                  <a:schemeClr val="tx2"/>
-                </a:solidFill>
-              </a:rPr>
-              <a:t>前端</a:t>
-            </a:r>
-            <a:r>
-              <a:rPr lang="en-US" altLang="zh-TW" sz="2800" dirty="0" smtClean="0">
-                <a:solidFill>
-                  <a:schemeClr val="tx2"/>
-                </a:solidFill>
-              </a:rPr>
-              <a:t>UI</a:t>
-            </a:r>
-            <a:r>
-              <a:rPr lang="zh-TW" altLang="en-US" sz="2800" dirty="0" smtClean="0">
-                <a:solidFill>
-                  <a:schemeClr val="tx2"/>
-                </a:solidFill>
-              </a:rPr>
-              <a:t>與</a:t>
-            </a:r>
-            <a:r>
-              <a:rPr lang="en-US" altLang="zh-TW" sz="2800" dirty="0" err="1" smtClean="0">
-                <a:solidFill>
-                  <a:schemeClr val="tx2"/>
-                </a:solidFill>
-              </a:rPr>
-              <a:t>GoogleMap</a:t>
-            </a:r>
-            <a:r>
-              <a:rPr lang="zh-TW" altLang="en-US" sz="2800" dirty="0" smtClean="0">
-                <a:solidFill>
-                  <a:schemeClr val="tx2"/>
-                </a:solidFill>
-              </a:rPr>
-              <a:t> </a:t>
-            </a:r>
-            <a:r>
-              <a:rPr lang="en-US" altLang="zh-TW" sz="2800" dirty="0" smtClean="0">
-                <a:solidFill>
-                  <a:schemeClr val="tx2"/>
-                </a:solidFill>
-              </a:rPr>
-              <a:t>API</a:t>
-            </a:r>
-            <a:r>
-              <a:rPr lang="zh-TW" altLang="en-US" sz="2800" dirty="0" smtClean="0">
-                <a:solidFill>
-                  <a:schemeClr val="tx2"/>
-                </a:solidFill>
-              </a:rPr>
-              <a:t>互動</a:t>
-            </a:r>
-            <a:endParaRPr lang="en-US" altLang="zh-TW" sz="2800" dirty="0" smtClean="0">
-              <a:solidFill>
-                <a:schemeClr val="tx2"/>
-              </a:solidFill>
-            </a:endParaRPr>
-          </a:p>
-          <a:p>
-            <a:pPr>
-              <a:buFont typeface="Arial" pitchFamily="34" charset="0"/>
-              <a:buChar char="•"/>
-            </a:pPr>
-            <a:r>
-              <a:rPr lang="zh-TW" altLang="en-US" sz="2800" dirty="0" smtClean="0">
-                <a:solidFill>
-                  <a:schemeClr val="tx2"/>
-                </a:solidFill>
-              </a:rPr>
-              <a:t> </a:t>
-            </a:r>
-            <a:r>
-              <a:rPr lang="en-US" altLang="zh-TW" sz="2800" dirty="0" smtClean="0">
-                <a:solidFill>
-                  <a:schemeClr val="tx2"/>
-                </a:solidFill>
-              </a:rPr>
-              <a:t>Eason</a:t>
-            </a:r>
-            <a:r>
-              <a:rPr lang="zh-TW" altLang="en-US" sz="2800" dirty="0" smtClean="0">
-                <a:solidFill>
-                  <a:schemeClr val="tx2"/>
-                </a:solidFill>
-              </a:rPr>
-              <a:t>主要負責部分前端</a:t>
-            </a:r>
-            <a:r>
-              <a:rPr lang="en-US" altLang="zh-TW" sz="2800" dirty="0" smtClean="0">
-                <a:solidFill>
-                  <a:schemeClr val="tx2"/>
-                </a:solidFill>
-              </a:rPr>
-              <a:t>UI</a:t>
-            </a:r>
-            <a:r>
-              <a:rPr lang="zh-TW" altLang="en-US" sz="2800" dirty="0" smtClean="0">
-                <a:solidFill>
-                  <a:schemeClr val="tx2"/>
-                </a:solidFill>
-              </a:rPr>
-              <a:t>與後端</a:t>
-            </a:r>
-            <a:r>
-              <a:rPr lang="zh-TW" altLang="en-US" sz="2800" dirty="0">
-                <a:solidFill>
-                  <a:schemeClr val="tx2"/>
-                </a:solidFill>
-              </a:rPr>
-              <a:t>網頁</a:t>
-            </a:r>
-            <a:r>
-              <a:rPr lang="zh-TW" altLang="en-US" sz="2800" dirty="0" smtClean="0">
-                <a:solidFill>
-                  <a:schemeClr val="tx2"/>
-                </a:solidFill>
-              </a:rPr>
-              <a:t>資料取得</a:t>
-            </a:r>
-            <a:endParaRPr lang="en-US" altLang="zh-TW" sz="2800" dirty="0">
-              <a:solidFill>
-                <a:schemeClr val="tx2"/>
-              </a:solidFill>
-            </a:endParaRPr>
-          </a:p>
-          <a:p>
-            <a:endParaRPr lang="zh-TW" altLang="en-US" dirty="0"/>
-          </a:p>
-        </p:txBody>
-      </p:sp>
     </p:spTree>
   </p:cSld>
   <p:clrMapOvr>
@@ -4409,7 +4429,7 @@
 </p:sld>
 </file>
 
-<file path=ppt/slides/slide12.xml><?xml version="1.0" encoding="utf-8"?>
+<file path=ppt/slides/slide15.xml><?xml version="1.0" encoding="utf-8"?>
 <p:sld xmlns:a="http://schemas.openxmlformats.org/drawingml/2006/main" xmlns:r="http://schemas.openxmlformats.org/officeDocument/2006/relationships" xmlns:p="http://schemas.openxmlformats.org/presentationml/2006/main">
   <p:cSld>
     <p:spTree>
@@ -4477,14 +4497,30 @@
           <a:p>
             <a:r>
               <a:rPr lang="zh-TW" altLang="en-US" dirty="0" smtClean="0"/>
-              <a:t>地點紀錄方式更友善</a:t>
+              <a:t>資料</a:t>
+            </a:r>
+            <a:r>
+              <a:rPr lang="zh-TW" altLang="en-US" dirty="0" smtClean="0"/>
+              <a:t>與資訊更貼近使用者</a:t>
+            </a:r>
+            <a:r>
+              <a:rPr lang="zh-TW" altLang="en-US" dirty="0" smtClean="0"/>
+              <a:t>需求</a:t>
             </a:r>
             <a:endParaRPr lang="en-US" altLang="zh-TW" dirty="0" smtClean="0"/>
           </a:p>
           <a:p>
             <a:r>
               <a:rPr lang="zh-TW" altLang="en-US" dirty="0" smtClean="0"/>
-              <a:t>資料與資訊更貼近使用者需求</a:t>
+              <a:t>提供更</a:t>
+            </a:r>
+            <a:r>
+              <a:rPr lang="zh-TW" altLang="en-US" dirty="0" smtClean="0"/>
+              <a:t>豐富實用的</a:t>
+            </a:r>
+            <a:r>
+              <a:rPr lang="zh-TW" altLang="en-US" dirty="0" smtClean="0"/>
+              <a:t>生活資訊</a:t>
             </a:r>
             <a:endParaRPr lang="en-US" altLang="zh-TW" dirty="0" smtClean="0"/>
           </a:p>
@@ -4508,7 +4544,7 @@
 </p:sld>
 </file>
 
-<file path=ppt/slides/slide13.xml><?xml version="1.0" encoding="utf-8"?>
+<file path=ppt/slides/slide16.xml><?xml version="1.0" encoding="utf-8"?>
 <p:sld xmlns:a="http://schemas.openxmlformats.org/drawingml/2006/main" xmlns:r="http://schemas.openxmlformats.org/officeDocument/2006/relationships" xmlns:p="http://schemas.openxmlformats.org/presentationml/2006/main">
   <p:cSld>
     <p:spTree>
@@ -4785,37 +4821,43 @@
           <a:p>
             <a:r>
               <a:rPr lang="zh-TW" altLang="en-US" dirty="0" smtClean="0"/>
-              <a:t>增加</a:t>
-            </a:r>
-            <a:r>
-              <a:rPr lang="zh-TW" altLang="en-US" dirty="0" smtClean="0"/>
-              <a:t>資訊種類</a:t>
+              <a:t>提供之資訊</a:t>
+            </a:r>
+            <a:r>
+              <a:rPr lang="zh-TW" altLang="en-US" dirty="0" smtClean="0"/>
+              <a:t>種類</a:t>
             </a:r>
             <a:endParaRPr lang="en-US" altLang="zh-TW" dirty="0" smtClean="0"/>
           </a:p>
           <a:p>
             <a:r>
               <a:rPr lang="zh-TW" altLang="en-US" dirty="0" smtClean="0"/>
-              <a:t>路徑</a:t>
-            </a:r>
-            <a:r>
-              <a:rPr lang="zh-TW" altLang="en-US" dirty="0" smtClean="0"/>
-              <a:t>規劃</a:t>
+              <a:t>路徑規劃</a:t>
             </a:r>
             <a:endParaRPr lang="en-US" altLang="zh-TW" dirty="0" smtClean="0"/>
           </a:p>
           <a:p>
             <a:r>
-              <a:rPr lang="en-US" altLang="zh-TW" dirty="0" smtClean="0"/>
-              <a:t>Login by Google/</a:t>
-            </a:r>
-            <a:r>
-              <a:rPr lang="en-US" altLang="zh-TW" dirty="0" err="1" smtClean="0"/>
-              <a:t>Facabook</a:t>
-            </a:r>
-            <a:r>
-              <a:rPr lang="en-US" altLang="zh-TW" dirty="0" smtClean="0"/>
-              <a:t> account</a:t>
+              <a:rPr lang="zh-TW" altLang="en-US" dirty="0" smtClean="0"/>
+              <a:t>登入帳號</a:t>
+            </a:r>
+            <a:endParaRPr lang="en-US" altLang="zh-TW" dirty="0" smtClean="0"/>
+          </a:p>
+          <a:p>
+            <a:r>
+              <a:rPr lang="zh-TW" altLang="en-US" dirty="0" smtClean="0"/>
+              <a:t>紀錄最愛地點</a:t>
+            </a:r>
+            <a:endParaRPr lang="en-US" altLang="zh-TW" dirty="0" smtClean="0"/>
+          </a:p>
+          <a:p>
+            <a:r>
+              <a:rPr lang="zh-TW" altLang="en-US" dirty="0" smtClean="0"/>
+              <a:t>提示</a:t>
+            </a:r>
+            <a:r>
+              <a:rPr lang="zh-TW" altLang="en-US" dirty="0" smtClean="0"/>
+              <a:t>訊息方式</a:t>
             </a:r>
             <a:endParaRPr lang="en-US" altLang="zh-TW" dirty="0" smtClean="0"/>
           </a:p>
@@ -4906,19 +4948,33 @@
             </a:r>
             <a:r>
               <a:rPr lang="zh-TW" altLang="en-US" dirty="0" smtClean="0"/>
-              <a:t>的概念進行介面調整以適應不同裝置的不同</a:t>
-            </a:r>
-            <a:r>
-              <a:rPr lang="zh-TW" altLang="en-US" dirty="0" smtClean="0"/>
-              <a:t>解析度</a:t>
+              <a:t>的概念進行介面調整以適應不同裝置的不同解析度</a:t>
             </a:r>
             <a:endParaRPr lang="en-US" altLang="zh-TW" dirty="0" smtClean="0"/>
           </a:p>
           <a:p>
             <a:r>
               <a:rPr lang="zh-TW" altLang="en-US" dirty="0" smtClean="0"/>
-              <a:t>使元件根據不同解析度進行動態的調整</a:t>
-            </a:r>
+              <a:t>改變版面分配方式</a:t>
+            </a:r>
+            <a:r>
+              <a:rPr lang="zh-TW" altLang="en-US" dirty="0" smtClean="0"/>
+              <a:t>使元件</a:t>
+            </a:r>
+            <a:r>
+              <a:rPr lang="zh-TW" altLang="en-US" dirty="0" smtClean="0"/>
+              <a:t>根據不同解析度進行動態的</a:t>
+            </a:r>
+            <a:r>
+              <a:rPr lang="zh-TW" altLang="en-US" dirty="0" smtClean="0"/>
+              <a:t>調整</a:t>
+            </a:r>
+            <a:endParaRPr lang="en-US" altLang="zh-TW" dirty="0" smtClean="0"/>
+          </a:p>
+          <a:p>
+            <a:endParaRPr lang="en-US" altLang="zh-TW" dirty="0" smtClean="0"/>
+          </a:p>
+          <a:p>
             <a:endParaRPr lang="en-US" altLang="zh-TW" dirty="0" smtClean="0"/>
           </a:p>
           <a:p>
@@ -5020,7 +5076,7 @@
         <p:spPr bwMode="auto">
           <a:xfrm>
             <a:off x="323528" y="1572344"/>
-            <a:ext cx="8568952" cy="4641516"/>
+            <a:ext cx="8612248" cy="4664968"/>
           </a:xfrm>
           <a:prstGeom prst="rect">
             <a:avLst/>
@@ -5252,7 +5308,7 @@
       </p:pic>
       <p:pic>
         <p:nvPicPr>
-          <p:cNvPr id="1028" name="Picture 4"/>
+          <p:cNvPr id="3074" name="Picture 2"/>
           <p:cNvPicPr>
             <a:picLocks noChangeAspect="1" noChangeArrowheads="1"/>
           </p:cNvPicPr>
@@ -5260,38 +5316,6 @@
         </p:nvPicPr>
         <p:blipFill>
           <a:blip r:embed="rId3" cstate="print"/>
-          <a:srcRect/>
-          <a:stretch>
-            <a:fillRect/>
-          </a:stretch>
-        </p:blipFill>
-        <p:spPr bwMode="auto">
-          <a:xfrm>
-            <a:off x="4499992" y="1556792"/>
-            <a:ext cx="2184182" cy="3888432"/>
-          </a:xfrm>
-          <a:prstGeom prst="rect">
-            <a:avLst/>
-          </a:prstGeom>
-          <a:noFill/>
-          <a:ln w="9525">
-            <a:noFill/>
-            <a:miter lim="800000"/>
-            <a:headEnd/>
-            <a:tailEnd/>
-          </a:ln>
-        </p:spPr>
-      </p:pic>
-      <p:pic>
-        <p:nvPicPr>
-          <p:cNvPr id="3074" name="Picture 2"/>
-          <p:cNvPicPr>
-            <a:picLocks noChangeAspect="1" noChangeArrowheads="1"/>
-          </p:cNvPicPr>
-          <p:nvPr/>
-        </p:nvPicPr>
-        <p:blipFill>
-          <a:blip r:embed="rId4" cstate="print"/>
           <a:srcRect/>
           <a:stretch>
             <a:fillRect/>
@@ -5316,7 +5340,39 @@
       </p:pic>
       <p:pic>
         <p:nvPicPr>
-          <p:cNvPr id="3075" name="Picture 3"/>
+          <p:cNvPr id="3076" name="Picture 4"/>
+          <p:cNvPicPr>
+            <a:picLocks noChangeAspect="1" noChangeArrowheads="1"/>
+          </p:cNvPicPr>
+          <p:nvPr/>
+        </p:nvPicPr>
+        <p:blipFill>
+          <a:blip r:embed="rId4" cstate="print"/>
+          <a:srcRect/>
+          <a:stretch>
+            <a:fillRect/>
+          </a:stretch>
+        </p:blipFill>
+        <p:spPr bwMode="auto">
+          <a:xfrm>
+            <a:off x="4548058" y="1556792"/>
+            <a:ext cx="2184182" cy="3888432"/>
+          </a:xfrm>
+          <a:prstGeom prst="rect">
+            <a:avLst/>
+          </a:prstGeom>
+          <a:noFill/>
+          <a:ln w="9525">
+            <a:noFill/>
+            <a:miter lim="800000"/>
+            <a:headEnd/>
+            <a:tailEnd/>
+          </a:ln>
+        </p:spPr>
+      </p:pic>
+      <p:pic>
+        <p:nvPicPr>
+          <p:cNvPr id="3078" name="Picture 6"/>
           <p:cNvPicPr>
             <a:picLocks noChangeAspect="1" noChangeArrowheads="1"/>
           </p:cNvPicPr>
@@ -5331,7 +5387,7 @@
         </p:blipFill>
         <p:spPr bwMode="auto">
           <a:xfrm>
-            <a:off x="6804248" y="1556792"/>
+            <a:off x="6876258" y="1556793"/>
             <a:ext cx="2184182" cy="3888432"/>
           </a:xfrm>
           <a:prstGeom prst="rect">
@@ -5395,7 +5451,15 @@
           <a:p>
             <a:r>
               <a:rPr lang="zh-TW" altLang="en-US" dirty="0" smtClean="0"/>
-              <a:t>增加資料種類</a:t>
+              <a:t>提供之</a:t>
+            </a:r>
+            <a:r>
+              <a:rPr lang="zh-TW" altLang="en-US" dirty="0" smtClean="0"/>
+              <a:t>資料</a:t>
+            </a:r>
+            <a:r>
+              <a:rPr lang="zh-TW" altLang="en-US" dirty="0" smtClean="0"/>
+              <a:t>種類</a:t>
             </a:r>
             <a:endParaRPr lang="zh-TW" altLang="en-US" dirty="0"/>
           </a:p>
@@ -5428,25 +5492,19 @@
             </a:r>
             <a:r>
               <a:rPr lang="zh-TW" altLang="en-US" dirty="0" smtClean="0"/>
-              <a:t>無線網路熱點及景點</a:t>
-            </a:r>
-            <a:r>
-              <a:rPr lang="zh-TW" altLang="en-US" dirty="0" smtClean="0"/>
-              <a:t>資訊之功能</a:t>
+              <a:t>無線網路熱點及景點資訊之</a:t>
+            </a:r>
+            <a:r>
+              <a:rPr lang="zh-TW" altLang="en-US" dirty="0" smtClean="0"/>
+              <a:t>功能</a:t>
             </a:r>
             <a:endParaRPr lang="en-US" altLang="zh-TW" dirty="0" smtClean="0"/>
-          </a:p>
-          <a:p>
-            <a:endParaRPr lang="en-US" altLang="zh-TW" dirty="0" smtClean="0"/>
-          </a:p>
-          <a:p>
-            <a:endParaRPr lang="zh-TW" altLang="en-US" dirty="0"/>
           </a:p>
         </p:txBody>
       </p:sp>
       <p:pic>
         <p:nvPicPr>
-          <p:cNvPr id="5123" name="Picture 3"/>
+          <p:cNvPr id="1026" name="Picture 2"/>
           <p:cNvPicPr>
             <a:picLocks noChangeAspect="1" noChangeArrowheads="1"/>
           </p:cNvPicPr>
@@ -5461,8 +5519,8 @@
         </p:blipFill>
         <p:spPr bwMode="auto">
           <a:xfrm>
-            <a:off x="323528" y="2636912"/>
-            <a:ext cx="5716328" cy="3096344"/>
+            <a:off x="6588224" y="2636912"/>
+            <a:ext cx="2304256" cy="4102196"/>
           </a:xfrm>
           <a:prstGeom prst="rect">
             <a:avLst/>
@@ -5478,7 +5536,7 @@
       </p:pic>
       <p:pic>
         <p:nvPicPr>
-          <p:cNvPr id="5124" name="Picture 4"/>
+          <p:cNvPr id="1027" name="Picture 3"/>
           <p:cNvPicPr>
             <a:picLocks noChangeAspect="1" noChangeArrowheads="1"/>
           </p:cNvPicPr>
@@ -5493,8 +5551,8 @@
         </p:blipFill>
         <p:spPr bwMode="auto">
           <a:xfrm>
-            <a:off x="6300192" y="2636912"/>
-            <a:ext cx="2280460" cy="4059832"/>
+            <a:off x="179512" y="2636912"/>
+            <a:ext cx="6264696" cy="3393377"/>
           </a:xfrm>
           <a:prstGeom prst="rect">
             <a:avLst/>
@@ -5582,7 +5640,19 @@
           <a:p>
             <a:r>
               <a:rPr lang="zh-TW" altLang="en-US" dirty="0" smtClean="0"/>
-              <a:t>點擊周邊區域之景點後會使用</a:t>
+              <a:t>點</a:t>
+            </a:r>
+            <a:r>
+              <a:rPr lang="zh-TW" altLang="en-US" dirty="0" smtClean="0"/>
+              <a:t>擊</a:t>
+            </a:r>
+            <a:r>
+              <a:rPr lang="en-US" altLang="zh-TW" dirty="0" smtClean="0"/>
+              <a:t>marker</a:t>
+            </a:r>
+            <a:r>
+              <a:rPr lang="zh-TW" altLang="en-US" dirty="0" smtClean="0"/>
+              <a:t>上的地點後網頁會以</a:t>
             </a:r>
             <a:r>
               <a:rPr lang="en-US" altLang="zh-TW" dirty="0" err="1" smtClean="0"/>
@@ -5590,11 +5660,27 @@
             </a:r>
             <a:r>
               <a:rPr lang="en-US" altLang="zh-TW" dirty="0" smtClean="0"/>
-              <a:t> map API</a:t>
-            </a:r>
-            <a:r>
-              <a:rPr lang="zh-TW" altLang="en-US" dirty="0" smtClean="0"/>
-              <a:t>進行路徑規劃</a:t>
+              <a:t> </a:t>
+            </a:r>
+            <a:r>
+              <a:rPr lang="en-US" altLang="zh-TW" dirty="0" smtClean="0"/>
+              <a:t>map </a:t>
+            </a:r>
+            <a:r>
+              <a:rPr lang="en-US" altLang="zh-TW" dirty="0" smtClean="0"/>
+              <a:t>API</a:t>
+            </a:r>
+            <a:r>
+              <a:rPr lang="zh-TW" altLang="en-US" dirty="0" smtClean="0"/>
+              <a:t>提供</a:t>
+            </a:r>
+            <a:r>
+              <a:rPr lang="zh-TW" altLang="en-US" dirty="0" smtClean="0"/>
+              <a:t>路徑</a:t>
+            </a:r>
+            <a:r>
+              <a:rPr lang="zh-TW" altLang="en-US" dirty="0" smtClean="0"/>
+              <a:t>規劃</a:t>
             </a:r>
             <a:endParaRPr lang="en-US" altLang="zh-TW" dirty="0" smtClean="0"/>
           </a:p>
@@ -5602,7 +5688,7 @@
       </p:sp>
       <p:pic>
         <p:nvPicPr>
-          <p:cNvPr id="4098" name="Picture 2"/>
+          <p:cNvPr id="2050" name="Picture 2"/>
           <p:cNvPicPr>
             <a:picLocks noChangeAspect="1" noChangeArrowheads="1"/>
           </p:cNvPicPr>
@@ -5617,8 +5703,8 @@
         </p:blipFill>
         <p:spPr bwMode="auto">
           <a:xfrm>
-            <a:off x="179512" y="2564904"/>
-            <a:ext cx="6381016" cy="3456384"/>
+            <a:off x="6588224" y="2639173"/>
+            <a:ext cx="2304256" cy="4102195"/>
           </a:xfrm>
           <a:prstGeom prst="rect">
             <a:avLst/>
@@ -5634,7 +5720,7 @@
       </p:pic>
       <p:pic>
         <p:nvPicPr>
-          <p:cNvPr id="4099" name="Picture 3"/>
+          <p:cNvPr id="2051" name="Picture 3"/>
           <p:cNvPicPr>
             <a:picLocks noChangeAspect="1" noChangeArrowheads="1"/>
           </p:cNvPicPr>
@@ -5649,8 +5735,8 @@
         </p:blipFill>
         <p:spPr bwMode="auto">
           <a:xfrm>
-            <a:off x="6738786" y="2564904"/>
-            <a:ext cx="2225702" cy="3960440"/>
+            <a:off x="179512" y="2636912"/>
+            <a:ext cx="6248078" cy="3384376"/>
           </a:xfrm>
           <a:prstGeom prst="rect">
             <a:avLst/>

</xml_diff>